<commit_message>
day-1 pre-lunch session update
</commit_message>
<xml_diff>
--- a/presentations/PPTs/Module-1-PLT_Day1[Part1 and 2].pptx
+++ b/presentations/PPTs/Module-1-PLT_Day1[Part1 and 2].pptx
@@ -237,7 +237,7 @@
           <a:p>
             <a:fld id="{577F61AD-4200-415C-948D-63395F00F600}" type="datetimeFigureOut">
               <a:rPr lang="en-US" smtClean="0"/>
-              <a:t>7/3/2017</a:t>
+              <a:t>7/26/2022</a:t>
             </a:fld>
             <a:endParaRPr lang="en-US"/>
           </a:p>
@@ -301,38 +301,37 @@
           <a:p>
             <a:pPr lvl="0"/>
             <a:r>
-              <a:rPr lang="en-US" smtClean="0"/>
+              <a:rPr lang="en-US"/>
               <a:t>Click to edit Master text styles</a:t>
             </a:r>
           </a:p>
           <a:p>
             <a:pPr lvl="1"/>
             <a:r>
-              <a:rPr lang="en-US" smtClean="0"/>
+              <a:rPr lang="en-US"/>
               <a:t>Second level</a:t>
             </a:r>
           </a:p>
           <a:p>
             <a:pPr lvl="2"/>
             <a:r>
-              <a:rPr lang="en-US" smtClean="0"/>
+              <a:rPr lang="en-US"/>
               <a:t>Third level</a:t>
             </a:r>
           </a:p>
           <a:p>
             <a:pPr lvl="3"/>
             <a:r>
-              <a:rPr lang="en-US" smtClean="0"/>
+              <a:rPr lang="en-US"/>
               <a:t>Fourth level</a:t>
             </a:r>
           </a:p>
           <a:p>
             <a:pPr lvl="4"/>
             <a:r>
-              <a:rPr lang="en-US" smtClean="0"/>
+              <a:rPr lang="en-US"/>
               <a:t>Fifth level</a:t>
             </a:r>
-            <a:endParaRPr lang="en-US"/>
           </a:p>
         </p:txBody>
       </p:sp>
@@ -886,13 +885,13 @@
           <a:lstStyle/>
           <a:p>
             <a:r>
-              <a:rPr lang="en-US" dirty="0" smtClean="0"/>
+              <a:rPr lang="en-US" dirty="0"/>
               <a:t>Notes:</a:t>
             </a:r>
           </a:p>
           <a:p>
             <a:r>
-              <a:rPr lang="en-US" sz="1200" b="0" i="0" kern="1200" dirty="0" smtClean="0">
+              <a:rPr lang="en-US" sz="1200" b="0" i="0" kern="1200" dirty="0">
                 <a:solidFill>
                   <a:schemeClr val="tx1"/>
                 </a:solidFill>
@@ -2668,7 +2667,7 @@
           <a:lstStyle/>
           <a:p>
             <a:r>
-              <a:rPr lang="en-US" dirty="0" smtClean="0"/>
+              <a:rPr lang="en-US" dirty="0"/>
               <a:t>Trainer Notes:</a:t>
             </a:r>
           </a:p>
@@ -2691,7 +2690,7 @@
               <a:defRPr/>
             </a:pPr>
             <a:r>
-              <a:rPr lang="en-US" dirty="0" smtClean="0"/>
+              <a:rPr lang="en-US" dirty="0"/>
               <a:t>A design is simply a higher-level description of those steps.</a:t>
             </a:r>
           </a:p>
@@ -2714,12 +2713,12 @@
               <a:defRPr/>
             </a:pPr>
             <a:r>
-              <a:rPr lang="en-US" dirty="0" smtClean="0"/>
+              <a:rPr lang="en-US" dirty="0"/>
               <a:t>In effect it's a program written as if the computer was a person. So, it doesn't have to completely spell out every step - because humans know how to do a lot of things already and have a lot of common sense, meaning that they can work the simple steps out for themselves. It also doesn't have to be written in any special programming language - English will do (although people often use special notations like pseudocode or flow charts for the more complicated sections).</a:t>
             </a:r>
           </a:p>
           <a:p>
-            <a:endParaRPr lang="en-US" dirty="0" smtClean="0"/>
+            <a:endParaRPr lang="en-US" dirty="0"/>
           </a:p>
           <a:p>
             <a:endParaRPr lang="en-US" dirty="0"/>
@@ -2891,13 +2890,13 @@
           <a:lstStyle/>
           <a:p>
             <a:r>
-              <a:rPr lang="en-US" dirty="0" smtClean="0"/>
+              <a:rPr lang="en-US" dirty="0"/>
               <a:t>Trainer notes:</a:t>
             </a:r>
           </a:p>
           <a:p>
             <a:r>
-              <a:rPr lang="en-US" sz="1200" b="0" i="0" kern="1200" dirty="0" smtClean="0">
+              <a:rPr lang="en-US" sz="1200" b="0" i="0" kern="1200" dirty="0">
                 <a:solidFill>
                   <a:schemeClr val="tx1"/>
                 </a:solidFill>
@@ -2909,7 +2908,7 @@
               <a:t>Here we assume that </a:t>
             </a:r>
             <a:r>
-              <a:rPr lang="en-US" sz="1200" b="1" i="0" kern="1200" dirty="0" smtClean="0">
+              <a:rPr lang="en-US" sz="1200" b="1" i="0" kern="1200" dirty="0">
                 <a:solidFill>
                   <a:schemeClr val="tx1"/>
                 </a:solidFill>
@@ -2921,7 +2920,7 @@
               <a:t>PRINT</a:t>
             </a:r>
             <a:r>
-              <a:rPr lang="en-US" sz="1200" b="0" i="0" kern="1200" dirty="0" smtClean="0">
+              <a:rPr lang="en-US" sz="1200" b="0" i="0" kern="1200" dirty="0">
                 <a:solidFill>
                   <a:schemeClr val="tx1"/>
                 </a:solidFill>
@@ -2933,7 +2932,7 @@
               <a:t> means 'put something on the screen' and </a:t>
             </a:r>
             <a:r>
-              <a:rPr lang="en-US" sz="1200" b="1" i="0" kern="1200" dirty="0" smtClean="0">
+              <a:rPr lang="en-US" sz="1200" b="1" i="0" kern="1200" dirty="0">
                 <a:solidFill>
                   <a:schemeClr val="tx1"/>
                 </a:solidFill>
@@ -2945,7 +2944,7 @@
               <a:t>READ</a:t>
             </a:r>
             <a:r>
-              <a:rPr lang="en-US" sz="1200" b="0" i="0" kern="1200" dirty="0" smtClean="0">
+              <a:rPr lang="en-US" sz="1200" b="0" i="0" kern="1200" dirty="0">
                 <a:solidFill>
                   <a:schemeClr val="tx1"/>
                 </a:solidFill>
@@ -2959,7 +2958,7 @@
           </a:p>
           <a:p>
             <a:r>
-              <a:rPr lang="en-US" sz="1200" b="0" i="0" kern="1200" dirty="0" smtClean="0">
+              <a:rPr lang="en-US" sz="1200" b="0" i="0" kern="1200" dirty="0">
                 <a:solidFill>
                   <a:schemeClr val="tx1"/>
                 </a:solidFill>
@@ -2973,7 +2972,7 @@
           </a:p>
           <a:p>
             <a:r>
-              <a:rPr lang="en-US" sz="1200" b="0" i="0" kern="1200" dirty="0" smtClean="0">
+              <a:rPr lang="en-US" sz="1200" b="0" i="0" kern="1200" dirty="0">
                 <a:solidFill>
                   <a:schemeClr val="tx1"/>
                 </a:solidFill>
@@ -2985,7 +2984,7 @@
               <a:t>Notice also how the design includes all of the important steps needed to fulfil our specification - but that doesn't go into too much unnecessary detail. This is called </a:t>
             </a:r>
             <a:r>
-              <a:rPr lang="en-US" sz="1200" b="0" i="1" kern="1200" dirty="0" smtClean="0">
+              <a:rPr lang="en-US" sz="1200" b="0" i="1" kern="1200" dirty="0">
                 <a:solidFill>
                   <a:schemeClr val="tx1"/>
                 </a:solidFill>
@@ -2997,7 +2996,7 @@
               <a:t>abstraction</a:t>
             </a:r>
             <a:r>
-              <a:rPr lang="en-US" sz="1200" b="0" i="0" kern="1200" dirty="0" smtClean="0">
+              <a:rPr lang="en-US" sz="1200" b="0" i="0" kern="1200" dirty="0">
                 <a:solidFill>
                   <a:schemeClr val="tx1"/>
                 </a:solidFill>
@@ -3625,7 +3624,7 @@
           </a:lstStyle>
           <a:p>
             <a:r>
-              <a:rPr lang="en-US" smtClean="0"/>
+              <a:rPr lang="en-US"/>
               <a:t>Click to edit Master title style</a:t>
             </a:r>
             <a:endParaRPr lang="en-US" dirty="0"/>
@@ -3745,7 +3744,7 @@
           </a:lstStyle>
           <a:p>
             <a:r>
-              <a:rPr lang="en-US" smtClean="0"/>
+              <a:rPr lang="en-US"/>
               <a:t>Click to edit Master subtitle style</a:t>
             </a:r>
             <a:endParaRPr lang="en-US" dirty="0"/>
@@ -3769,7 +3768,7 @@
           <a:p>
             <a:fld id="{72F5FD58-ACBC-4727-85F7-6C322205A44C}" type="datetimeFigureOut">
               <a:rPr lang="en-US" smtClean="0"/>
-              <a:t>7/3/2017</a:t>
+              <a:t>7/26/2022</a:t>
             </a:fld>
             <a:endParaRPr lang="en-US"/>
           </a:p>
@@ -3904,7 +3903,7 @@
           </a:lstStyle>
           <a:p>
             <a:r>
-              <a:rPr lang="en-US" smtClean="0"/>
+              <a:rPr lang="en-US"/>
               <a:t>Click to edit Master title style</a:t>
             </a:r>
             <a:endParaRPr lang="en-US" dirty="0"/>
@@ -4027,7 +4026,7 @@
           <a:p>
             <a:pPr lvl="0"/>
             <a:r>
-              <a:rPr lang="en-US" smtClean="0"/>
+              <a:rPr lang="en-US"/>
               <a:t>Click to edit Master text styles</a:t>
             </a:r>
           </a:p>
@@ -4050,7 +4049,7 @@
           <a:p>
             <a:fld id="{72F5FD58-ACBC-4727-85F7-6C322205A44C}" type="datetimeFigureOut">
               <a:rPr lang="en-US" smtClean="0"/>
-              <a:t>7/3/2017</a:t>
+              <a:t>7/26/2022</a:t>
             </a:fld>
             <a:endParaRPr lang="en-US"/>
           </a:p>
@@ -4155,7 +4154,7 @@
           </a:lstStyle>
           <a:p>
             <a:r>
-              <a:rPr lang="en-US" smtClean="0"/>
+              <a:rPr lang="en-US"/>
               <a:t>Click to edit Master title style</a:t>
             </a:r>
             <a:endParaRPr lang="en-US" dirty="0"/>
@@ -4219,7 +4218,7 @@
           <a:p>
             <a:pPr lvl="0"/>
             <a:r>
-              <a:rPr lang="en-US" smtClean="0"/>
+              <a:rPr lang="en-US"/>
               <a:t>Click to edit Master text styles</a:t>
             </a:r>
           </a:p>
@@ -4341,7 +4340,7 @@
           <a:p>
             <a:pPr lvl="0"/>
             <a:r>
-              <a:rPr lang="en-US" smtClean="0"/>
+              <a:rPr lang="en-US"/>
               <a:t>Click to edit Master text styles</a:t>
             </a:r>
           </a:p>
@@ -4364,7 +4363,7 @@
           <a:p>
             <a:fld id="{72F5FD58-ACBC-4727-85F7-6C322205A44C}" type="datetimeFigureOut">
               <a:rPr lang="en-US" smtClean="0"/>
-              <a:t>7/3/2017</a:t>
+              <a:t>7/26/2022</a:t>
             </a:fld>
             <a:endParaRPr lang="en-US"/>
           </a:p>
@@ -4559,7 +4558,7 @@
           </a:lstStyle>
           <a:p>
             <a:r>
-              <a:rPr lang="en-US" smtClean="0"/>
+              <a:rPr lang="en-US"/>
               <a:t>Click to edit Master title style</a:t>
             </a:r>
             <a:endParaRPr lang="en-US" dirty="0"/>
@@ -4682,7 +4681,7 @@
           <a:p>
             <a:pPr lvl="0"/>
             <a:r>
-              <a:rPr lang="en-US" smtClean="0"/>
+              <a:rPr lang="en-US"/>
               <a:t>Click to edit Master text styles</a:t>
             </a:r>
           </a:p>
@@ -4705,7 +4704,7 @@
           <a:p>
             <a:fld id="{72F5FD58-ACBC-4727-85F7-6C322205A44C}" type="datetimeFigureOut">
               <a:rPr lang="en-US" smtClean="0"/>
-              <a:t>7/3/2017</a:t>
+              <a:t>7/26/2022</a:t>
             </a:fld>
             <a:endParaRPr lang="en-US"/>
           </a:p>
@@ -4810,7 +4809,7 @@
           </a:lstStyle>
           <a:p>
             <a:r>
-              <a:rPr lang="en-US" smtClean="0"/>
+              <a:rPr lang="en-US"/>
               <a:t>Click to edit Master title style</a:t>
             </a:r>
             <a:endParaRPr lang="en-US" dirty="0"/>
@@ -4874,7 +4873,7 @@
           <a:p>
             <a:pPr lvl="0"/>
             <a:r>
-              <a:rPr lang="en-US" smtClean="0"/>
+              <a:rPr lang="en-US"/>
               <a:t>Click to edit Master text styles</a:t>
             </a:r>
           </a:p>
@@ -4996,7 +4995,7 @@
           <a:p>
             <a:pPr lvl="0"/>
             <a:r>
-              <a:rPr lang="en-US" smtClean="0"/>
+              <a:rPr lang="en-US"/>
               <a:t>Click to edit Master text styles</a:t>
             </a:r>
           </a:p>
@@ -5019,7 +5018,7 @@
           <a:p>
             <a:fld id="{72F5FD58-ACBC-4727-85F7-6C322205A44C}" type="datetimeFigureOut">
               <a:rPr lang="en-US" smtClean="0"/>
-              <a:t>7/3/2017</a:t>
+              <a:t>7/26/2022</a:t>
             </a:fld>
             <a:endParaRPr lang="en-US"/>
           </a:p>
@@ -5206,7 +5205,7 @@
           </a:lstStyle>
           <a:p>
             <a:r>
-              <a:rPr lang="en-US" smtClean="0"/>
+              <a:rPr lang="en-US"/>
               <a:t>Click to edit Master title style</a:t>
             </a:r>
             <a:endParaRPr lang="en-US" dirty="0"/>
@@ -5267,7 +5266,7 @@
           <a:p>
             <a:pPr lvl="0"/>
             <a:r>
-              <a:rPr lang="en-US" smtClean="0"/>
+              <a:rPr lang="en-US"/>
               <a:t>Click to edit Master text styles</a:t>
             </a:r>
           </a:p>
@@ -5389,7 +5388,7 @@
           <a:p>
             <a:pPr lvl="0"/>
             <a:r>
-              <a:rPr lang="en-US" smtClean="0"/>
+              <a:rPr lang="en-US"/>
               <a:t>Click to edit Master text styles</a:t>
             </a:r>
           </a:p>
@@ -5412,7 +5411,7 @@
           <a:p>
             <a:fld id="{72F5FD58-ACBC-4727-85F7-6C322205A44C}" type="datetimeFigureOut">
               <a:rPr lang="en-US" smtClean="0"/>
-              <a:t>7/3/2017</a:t>
+              <a:t>7/26/2022</a:t>
             </a:fld>
             <a:endParaRPr lang="en-US"/>
           </a:p>
@@ -5506,7 +5505,7 @@
           <a:lstStyle/>
           <a:p>
             <a:r>
-              <a:rPr lang="en-US" smtClean="0"/>
+              <a:rPr lang="en-US"/>
               <a:t>Click to edit Master title style</a:t>
             </a:r>
             <a:endParaRPr lang="en-US" dirty="0"/>
@@ -5530,35 +5529,35 @@
           <a:p>
             <a:pPr lvl="0"/>
             <a:r>
-              <a:rPr lang="en-US" smtClean="0"/>
+              <a:rPr lang="en-US"/>
               <a:t>Click to edit Master text styles</a:t>
             </a:r>
           </a:p>
           <a:p>
             <a:pPr lvl="1"/>
             <a:r>
-              <a:rPr lang="en-US" smtClean="0"/>
+              <a:rPr lang="en-US"/>
               <a:t>Second level</a:t>
             </a:r>
           </a:p>
           <a:p>
             <a:pPr lvl="2"/>
             <a:r>
-              <a:rPr lang="en-US" smtClean="0"/>
+              <a:rPr lang="en-US"/>
               <a:t>Third level</a:t>
             </a:r>
           </a:p>
           <a:p>
             <a:pPr lvl="3"/>
             <a:r>
-              <a:rPr lang="en-US" smtClean="0"/>
+              <a:rPr lang="en-US"/>
               <a:t>Fourth level</a:t>
             </a:r>
           </a:p>
           <a:p>
             <a:pPr lvl="4"/>
             <a:r>
-              <a:rPr lang="en-US" smtClean="0"/>
+              <a:rPr lang="en-US"/>
               <a:t>Fifth level</a:t>
             </a:r>
             <a:endParaRPr lang="en-US" dirty="0"/>
@@ -5582,7 +5581,7 @@
           <a:p>
             <a:fld id="{72F5FD58-ACBC-4727-85F7-6C322205A44C}" type="datetimeFigureOut">
               <a:rPr lang="en-US" smtClean="0"/>
-              <a:t>7/3/2017</a:t>
+              <a:t>7/26/2022</a:t>
             </a:fld>
             <a:endParaRPr lang="en-US"/>
           </a:p>
@@ -5681,7 +5680,7 @@
           <a:lstStyle/>
           <a:p>
             <a:r>
-              <a:rPr lang="en-US" smtClean="0"/>
+              <a:rPr lang="en-US"/>
               <a:t>Click to edit Master title style</a:t>
             </a:r>
             <a:endParaRPr lang="en-US" dirty="0"/>
@@ -5710,35 +5709,35 @@
           <a:p>
             <a:pPr lvl="0"/>
             <a:r>
-              <a:rPr lang="en-US" smtClean="0"/>
+              <a:rPr lang="en-US"/>
               <a:t>Click to edit Master text styles</a:t>
             </a:r>
           </a:p>
           <a:p>
             <a:pPr lvl="1"/>
             <a:r>
-              <a:rPr lang="en-US" smtClean="0"/>
+              <a:rPr lang="en-US"/>
               <a:t>Second level</a:t>
             </a:r>
           </a:p>
           <a:p>
             <a:pPr lvl="2"/>
             <a:r>
-              <a:rPr lang="en-US" smtClean="0"/>
+              <a:rPr lang="en-US"/>
               <a:t>Third level</a:t>
             </a:r>
           </a:p>
           <a:p>
             <a:pPr lvl="3"/>
             <a:r>
-              <a:rPr lang="en-US" smtClean="0"/>
+              <a:rPr lang="en-US"/>
               <a:t>Fourth level</a:t>
             </a:r>
           </a:p>
           <a:p>
             <a:pPr lvl="4"/>
             <a:r>
-              <a:rPr lang="en-US" smtClean="0"/>
+              <a:rPr lang="en-US"/>
               <a:t>Fifth level</a:t>
             </a:r>
             <a:endParaRPr lang="en-US" dirty="0"/>
@@ -5762,7 +5761,7 @@
           <a:p>
             <a:fld id="{72F5FD58-ACBC-4727-85F7-6C322205A44C}" type="datetimeFigureOut">
               <a:rPr lang="en-US" smtClean="0"/>
-              <a:t>7/3/2017</a:t>
+              <a:t>7/26/2022</a:t>
             </a:fld>
             <a:endParaRPr lang="en-US"/>
           </a:p>
@@ -5862,7 +5861,7 @@
           </a:lstStyle>
           <a:p>
             <a:r>
-              <a:rPr lang="en-US" smtClean="0"/>
+              <a:rPr lang="en-US"/>
               <a:t>Click to edit Master title style</a:t>
             </a:r>
             <a:endParaRPr lang="en-US" dirty="0"/>
@@ -5886,35 +5885,35 @@
           <a:p>
             <a:pPr lvl="0"/>
             <a:r>
-              <a:rPr lang="en-US" smtClean="0"/>
+              <a:rPr lang="en-US"/>
               <a:t>Click to edit Master text styles</a:t>
             </a:r>
           </a:p>
           <a:p>
             <a:pPr lvl="1"/>
             <a:r>
-              <a:rPr lang="en-US" smtClean="0"/>
+              <a:rPr lang="en-US"/>
               <a:t>Second level</a:t>
             </a:r>
           </a:p>
           <a:p>
             <a:pPr lvl="2"/>
             <a:r>
-              <a:rPr lang="en-US" smtClean="0"/>
+              <a:rPr lang="en-US"/>
               <a:t>Third level</a:t>
             </a:r>
           </a:p>
           <a:p>
             <a:pPr lvl="3"/>
             <a:r>
-              <a:rPr lang="en-US" smtClean="0"/>
+              <a:rPr lang="en-US"/>
               <a:t>Fourth level</a:t>
             </a:r>
           </a:p>
           <a:p>
             <a:pPr lvl="4"/>
             <a:r>
-              <a:rPr lang="en-US" smtClean="0"/>
+              <a:rPr lang="en-US"/>
               <a:t>Fifth level</a:t>
             </a:r>
             <a:endParaRPr lang="en-US" dirty="0"/>
@@ -5938,7 +5937,7 @@
           <a:p>
             <a:fld id="{72F5FD58-ACBC-4727-85F7-6C322205A44C}" type="datetimeFigureOut">
               <a:rPr lang="en-US" smtClean="0"/>
-              <a:t>7/3/2017</a:t>
+              <a:t>7/26/2022</a:t>
             </a:fld>
             <a:endParaRPr lang="en-US"/>
           </a:p>
@@ -6071,7 +6070,7 @@
           </a:lstStyle>
           <a:p>
             <a:r>
-              <a:rPr lang="en-US" smtClean="0"/>
+              <a:rPr lang="en-US"/>
               <a:t>Click to edit Master title style</a:t>
             </a:r>
             <a:endParaRPr lang="en-US" dirty="0"/>
@@ -6192,7 +6191,7 @@
           <a:p>
             <a:pPr lvl="0"/>
             <a:r>
-              <a:rPr lang="en-US" smtClean="0"/>
+              <a:rPr lang="en-US"/>
               <a:t>Click to edit Master text styles</a:t>
             </a:r>
           </a:p>
@@ -6215,7 +6214,7 @@
           <a:p>
             <a:fld id="{72F5FD58-ACBC-4727-85F7-6C322205A44C}" type="datetimeFigureOut">
               <a:rPr lang="en-US" smtClean="0"/>
-              <a:t>7/3/2017</a:t>
+              <a:t>7/26/2022</a:t>
             </a:fld>
             <a:endParaRPr lang="en-US"/>
           </a:p>
@@ -6339,7 +6338,7 @@
           <a:lstStyle/>
           <a:p>
             <a:r>
-              <a:rPr lang="en-US" smtClean="0"/>
+              <a:rPr lang="en-US"/>
               <a:t>Click to edit Master title style</a:t>
             </a:r>
             <a:endParaRPr lang="en-US" dirty="0"/>
@@ -6368,35 +6367,35 @@
           <a:p>
             <a:pPr lvl="0"/>
             <a:r>
-              <a:rPr lang="en-US" smtClean="0"/>
+              <a:rPr lang="en-US"/>
               <a:t>Click to edit Master text styles</a:t>
             </a:r>
           </a:p>
           <a:p>
             <a:pPr lvl="1"/>
             <a:r>
-              <a:rPr lang="en-US" smtClean="0"/>
+              <a:rPr lang="en-US"/>
               <a:t>Second level</a:t>
             </a:r>
           </a:p>
           <a:p>
             <a:pPr lvl="2"/>
             <a:r>
-              <a:rPr lang="en-US" smtClean="0"/>
+              <a:rPr lang="en-US"/>
               <a:t>Third level</a:t>
             </a:r>
           </a:p>
           <a:p>
             <a:pPr lvl="3"/>
             <a:r>
-              <a:rPr lang="en-US" smtClean="0"/>
+              <a:rPr lang="en-US"/>
               <a:t>Fourth level</a:t>
             </a:r>
           </a:p>
           <a:p>
             <a:pPr lvl="4"/>
             <a:r>
-              <a:rPr lang="en-US" smtClean="0"/>
+              <a:rPr lang="en-US"/>
               <a:t>Fifth level</a:t>
             </a:r>
             <a:endParaRPr lang="en-US" dirty="0"/>
@@ -6425,35 +6424,35 @@
           <a:p>
             <a:pPr lvl="0"/>
             <a:r>
-              <a:rPr lang="en-US" smtClean="0"/>
+              <a:rPr lang="en-US"/>
               <a:t>Click to edit Master text styles</a:t>
             </a:r>
           </a:p>
           <a:p>
             <a:pPr lvl="1"/>
             <a:r>
-              <a:rPr lang="en-US" smtClean="0"/>
+              <a:rPr lang="en-US"/>
               <a:t>Second level</a:t>
             </a:r>
           </a:p>
           <a:p>
             <a:pPr lvl="2"/>
             <a:r>
-              <a:rPr lang="en-US" smtClean="0"/>
+              <a:rPr lang="en-US"/>
               <a:t>Third level</a:t>
             </a:r>
           </a:p>
           <a:p>
             <a:pPr lvl="3"/>
             <a:r>
-              <a:rPr lang="en-US" smtClean="0"/>
+              <a:rPr lang="en-US"/>
               <a:t>Fourth level</a:t>
             </a:r>
           </a:p>
           <a:p>
             <a:pPr lvl="4"/>
             <a:r>
-              <a:rPr lang="en-US" smtClean="0"/>
+              <a:rPr lang="en-US"/>
               <a:t>Fifth level</a:t>
             </a:r>
             <a:endParaRPr lang="en-US" dirty="0"/>
@@ -6477,7 +6476,7 @@
           <a:p>
             <a:fld id="{72F5FD58-ACBC-4727-85F7-6C322205A44C}" type="datetimeFigureOut">
               <a:rPr lang="en-US" smtClean="0"/>
-              <a:t>7/3/2017</a:t>
+              <a:t>7/26/2022</a:t>
             </a:fld>
             <a:endParaRPr lang="en-US"/>
           </a:p>
@@ -6605,7 +6604,7 @@
           </a:lstStyle>
           <a:p>
             <a:r>
-              <a:rPr lang="en-US" smtClean="0"/>
+              <a:rPr lang="en-US"/>
               <a:t>Click to edit Master title style</a:t>
             </a:r>
             <a:endParaRPr lang="en-US" dirty="0"/>
@@ -6673,7 +6672,7 @@
           <a:p>
             <a:pPr lvl="0"/>
             <a:r>
-              <a:rPr lang="en-US" smtClean="0"/>
+              <a:rPr lang="en-US"/>
               <a:t>Click to edit Master text styles</a:t>
             </a:r>
           </a:p>
@@ -6703,35 +6702,35 @@
           <a:p>
             <a:pPr lvl="0"/>
             <a:r>
-              <a:rPr lang="en-US" smtClean="0"/>
+              <a:rPr lang="en-US"/>
               <a:t>Click to edit Master text styles</a:t>
             </a:r>
           </a:p>
           <a:p>
             <a:pPr lvl="1"/>
             <a:r>
-              <a:rPr lang="en-US" smtClean="0"/>
+              <a:rPr lang="en-US"/>
               <a:t>Second level</a:t>
             </a:r>
           </a:p>
           <a:p>
             <a:pPr lvl="2"/>
             <a:r>
-              <a:rPr lang="en-US" smtClean="0"/>
+              <a:rPr lang="en-US"/>
               <a:t>Third level</a:t>
             </a:r>
           </a:p>
           <a:p>
             <a:pPr lvl="3"/>
             <a:r>
-              <a:rPr lang="en-US" smtClean="0"/>
+              <a:rPr lang="en-US"/>
               <a:t>Fourth level</a:t>
             </a:r>
           </a:p>
           <a:p>
             <a:pPr lvl="4"/>
             <a:r>
-              <a:rPr lang="en-US" smtClean="0"/>
+              <a:rPr lang="en-US"/>
               <a:t>Fifth level</a:t>
             </a:r>
             <a:endParaRPr lang="en-US" dirty="0"/>
@@ -6799,7 +6798,7 @@
           <a:p>
             <a:pPr lvl="0"/>
             <a:r>
-              <a:rPr lang="en-US" smtClean="0"/>
+              <a:rPr lang="en-US"/>
               <a:t>Click to edit Master text styles</a:t>
             </a:r>
           </a:p>
@@ -6829,35 +6828,35 @@
           <a:p>
             <a:pPr lvl="0"/>
             <a:r>
-              <a:rPr lang="en-US" smtClean="0"/>
+              <a:rPr lang="en-US"/>
               <a:t>Click to edit Master text styles</a:t>
             </a:r>
           </a:p>
           <a:p>
             <a:pPr lvl="1"/>
             <a:r>
-              <a:rPr lang="en-US" smtClean="0"/>
+              <a:rPr lang="en-US"/>
               <a:t>Second level</a:t>
             </a:r>
           </a:p>
           <a:p>
             <a:pPr lvl="2"/>
             <a:r>
-              <a:rPr lang="en-US" smtClean="0"/>
+              <a:rPr lang="en-US"/>
               <a:t>Third level</a:t>
             </a:r>
           </a:p>
           <a:p>
             <a:pPr lvl="3"/>
             <a:r>
-              <a:rPr lang="en-US" smtClean="0"/>
+              <a:rPr lang="en-US"/>
               <a:t>Fourth level</a:t>
             </a:r>
           </a:p>
           <a:p>
             <a:pPr lvl="4"/>
             <a:r>
-              <a:rPr lang="en-US" smtClean="0"/>
+              <a:rPr lang="en-US"/>
               <a:t>Fifth level</a:t>
             </a:r>
             <a:endParaRPr lang="en-US" dirty="0"/>
@@ -6881,7 +6880,7 @@
           <a:p>
             <a:fld id="{72F5FD58-ACBC-4727-85F7-6C322205A44C}" type="datetimeFigureOut">
               <a:rPr lang="en-US" smtClean="0"/>
-              <a:t>7/3/2017</a:t>
+              <a:t>7/26/2022</a:t>
             </a:fld>
             <a:endParaRPr lang="en-US"/>
           </a:p>
@@ -6980,7 +6979,7 @@
           <a:lstStyle/>
           <a:p>
             <a:r>
-              <a:rPr lang="en-US" smtClean="0"/>
+              <a:rPr lang="en-US"/>
               <a:t>Click to edit Master title style</a:t>
             </a:r>
             <a:endParaRPr lang="en-US" dirty="0"/>
@@ -7004,7 +7003,7 @@
           <a:p>
             <a:fld id="{72F5FD58-ACBC-4727-85F7-6C322205A44C}" type="datetimeFigureOut">
               <a:rPr lang="en-US" smtClean="0"/>
-              <a:t>7/3/2017</a:t>
+              <a:t>7/26/2022</a:t>
             </a:fld>
             <a:endParaRPr lang="en-US"/>
           </a:p>
@@ -7129,7 +7128,7 @@
           <a:p>
             <a:fld id="{72F5FD58-ACBC-4727-85F7-6C322205A44C}" type="datetimeFigureOut">
               <a:rPr lang="en-US" smtClean="0"/>
-              <a:t>7/3/2017</a:t>
+              <a:t>7/26/2022</a:t>
             </a:fld>
             <a:endParaRPr lang="en-US"/>
           </a:p>
@@ -7264,7 +7263,7 @@
           </a:lstStyle>
           <a:p>
             <a:r>
-              <a:rPr lang="en-US" smtClean="0"/>
+              <a:rPr lang="en-US"/>
               <a:t>Click to edit Master title style</a:t>
             </a:r>
             <a:endParaRPr lang="en-US" dirty="0"/>
@@ -7295,35 +7294,35 @@
           <a:p>
             <a:pPr lvl="0"/>
             <a:r>
-              <a:rPr lang="en-US" smtClean="0"/>
+              <a:rPr lang="en-US"/>
               <a:t>Click to edit Master text styles</a:t>
             </a:r>
           </a:p>
           <a:p>
             <a:pPr lvl="1"/>
             <a:r>
-              <a:rPr lang="en-US" smtClean="0"/>
+              <a:rPr lang="en-US"/>
               <a:t>Second level</a:t>
             </a:r>
           </a:p>
           <a:p>
             <a:pPr lvl="2"/>
             <a:r>
-              <a:rPr lang="en-US" smtClean="0"/>
+              <a:rPr lang="en-US"/>
               <a:t>Third level</a:t>
             </a:r>
           </a:p>
           <a:p>
             <a:pPr lvl="3"/>
             <a:r>
-              <a:rPr lang="en-US" smtClean="0"/>
+              <a:rPr lang="en-US"/>
               <a:t>Fourth level</a:t>
             </a:r>
           </a:p>
           <a:p>
             <a:pPr lvl="4"/>
             <a:r>
-              <a:rPr lang="en-US" smtClean="0"/>
+              <a:rPr lang="en-US"/>
               <a:t>Fifth level</a:t>
             </a:r>
             <a:endParaRPr lang="en-US" dirty="0"/>
@@ -7391,7 +7390,7 @@
           <a:p>
             <a:pPr lvl="0"/>
             <a:r>
-              <a:rPr lang="en-US" smtClean="0"/>
+              <a:rPr lang="en-US"/>
               <a:t>Click to edit Master text styles</a:t>
             </a:r>
           </a:p>
@@ -7414,7 +7413,7 @@
           <a:p>
             <a:fld id="{72F5FD58-ACBC-4727-85F7-6C322205A44C}" type="datetimeFigureOut">
               <a:rPr lang="en-US" smtClean="0"/>
-              <a:t>7/3/2017</a:t>
+              <a:t>7/26/2022</a:t>
             </a:fld>
             <a:endParaRPr lang="en-US"/>
           </a:p>
@@ -7519,7 +7518,7 @@
           </a:lstStyle>
           <a:p>
             <a:r>
-              <a:rPr lang="en-US" smtClean="0"/>
+              <a:rPr lang="en-US"/>
               <a:t>Click to edit Master title style</a:t>
             </a:r>
             <a:endParaRPr lang="en-US" dirty="0"/>
@@ -7586,7 +7585,7 @@
           </a:lstStyle>
           <a:p>
             <a:r>
-              <a:rPr lang="en-US" smtClean="0"/>
+              <a:rPr lang="en-US"/>
               <a:t>Click icon to add picture</a:t>
             </a:r>
             <a:endParaRPr lang="en-US" dirty="0"/>
@@ -7654,7 +7653,7 @@
           <a:p>
             <a:pPr lvl="0"/>
             <a:r>
-              <a:rPr lang="en-US" smtClean="0"/>
+              <a:rPr lang="en-US"/>
               <a:t>Click to edit Master text styles</a:t>
             </a:r>
           </a:p>
@@ -7677,7 +7676,7 @@
           <a:p>
             <a:fld id="{72F5FD58-ACBC-4727-85F7-6C322205A44C}" type="datetimeFigureOut">
               <a:rPr lang="en-US" smtClean="0"/>
-              <a:t>7/3/2017</a:t>
+              <a:t>7/26/2022</a:t>
             </a:fld>
             <a:endParaRPr lang="en-US"/>
           </a:p>
@@ -8316,7 +8315,7 @@
           <a:lstStyle/>
           <a:p>
             <a:r>
-              <a:rPr lang="en-US" smtClean="0"/>
+              <a:rPr lang="en-US"/>
               <a:t>Click to edit Master title style</a:t>
             </a:r>
             <a:endParaRPr lang="en-US" dirty="0"/>
@@ -8350,35 +8349,35 @@
           <a:p>
             <a:pPr lvl="0"/>
             <a:r>
-              <a:rPr lang="en-US" smtClean="0"/>
+              <a:rPr lang="en-US"/>
               <a:t>Click to edit Master text styles</a:t>
             </a:r>
           </a:p>
           <a:p>
             <a:pPr lvl="1"/>
             <a:r>
-              <a:rPr lang="en-US" smtClean="0"/>
+              <a:rPr lang="en-US"/>
               <a:t>Second level</a:t>
             </a:r>
           </a:p>
           <a:p>
             <a:pPr lvl="2"/>
             <a:r>
-              <a:rPr lang="en-US" smtClean="0"/>
+              <a:rPr lang="en-US"/>
               <a:t>Third level</a:t>
             </a:r>
           </a:p>
           <a:p>
             <a:pPr lvl="3"/>
             <a:r>
-              <a:rPr lang="en-US" smtClean="0"/>
+              <a:rPr lang="en-US"/>
               <a:t>Fourth level</a:t>
             </a:r>
           </a:p>
           <a:p>
             <a:pPr lvl="4"/>
             <a:r>
-              <a:rPr lang="en-US" smtClean="0"/>
+              <a:rPr lang="en-US"/>
               <a:t>Fifth level</a:t>
             </a:r>
             <a:endParaRPr lang="en-US" dirty="0"/>
@@ -8420,7 +8419,7 @@
           <a:p>
             <a:fld id="{72F5FD58-ACBC-4727-85F7-6C322205A44C}" type="datetimeFigureOut">
               <a:rPr lang="en-US" smtClean="0"/>
-              <a:t>7/3/2017</a:t>
+              <a:t>7/26/2022</a:t>
             </a:fld>
             <a:endParaRPr lang="en-US"/>
           </a:p>
@@ -8965,10 +8964,9 @@
           <a:lstStyle/>
           <a:p>
             <a:r>
-              <a:rPr lang="en-US" dirty="0" smtClean="0"/>
+              <a:rPr lang="en-US" dirty="0"/>
               <a:t>Programming Languages and Technologies –Part1 &amp; 2</a:t>
             </a:r>
-            <a:endParaRPr lang="en-US" dirty="0"/>
           </a:p>
         </p:txBody>
       </p:sp>
@@ -8988,10 +8986,9 @@
           <a:lstStyle/>
           <a:p>
             <a:r>
-              <a:rPr lang="en-US" dirty="0" smtClean="0"/>
+              <a:rPr lang="en-US" dirty="0"/>
               <a:t>Important steps in programming and different programming methodology</a:t>
             </a:r>
-            <a:endParaRPr lang="en-US" dirty="0"/>
           </a:p>
         </p:txBody>
       </p:sp>
@@ -9005,13 +9002,6 @@
   <p:clrMapOvr>
     <a:masterClrMapping/>
   </p:clrMapOvr>
-  <p:timing>
-    <p:tnLst>
-      <p:par>
-        <p:cTn id="1" dur="indefinite" restart="never" nodeType="tmRoot"/>
-      </p:par>
-    </p:tnLst>
-  </p:timing>
 </p:sld>
 </file>
 
@@ -9048,10 +9038,9 @@
           <a:lstStyle/>
           <a:p>
             <a:r>
-              <a:rPr lang="en-US" dirty="0" smtClean="0"/>
+              <a:rPr lang="en-US" dirty="0"/>
               <a:t>Specification</a:t>
             </a:r>
-            <a:endParaRPr lang="en-US" dirty="0"/>
           </a:p>
         </p:txBody>
       </p:sp>
@@ -9074,38 +9063,17 @@
               <a:rPr lang="en-US" dirty="0"/>
               <a:t>The second step is to then look at the list of requirements and to decide exactly what your solution should do to fulfil them. </a:t>
             </a:r>
-            <a:endParaRPr lang="en-US" dirty="0" smtClean="0"/>
-          </a:p>
-          <a:p>
-            <a:r>
-              <a:rPr lang="en-US" dirty="0" smtClean="0"/>
-              <a:t>As </a:t>
-            </a:r>
+          </a:p>
+          <a:p>
             <a:r>
               <a:rPr lang="en-US" dirty="0"/>
-              <a:t>we mentioned </a:t>
-            </a:r>
-            <a:r>
-              <a:rPr lang="en-US" dirty="0" smtClean="0"/>
-              <a:t>earlier, </a:t>
-            </a:r>
+              <a:t>As we mentioned earlier, there are usually many different solutions to a single problem; here, your aim is to decide on which of those solutions you want.</a:t>
+            </a:r>
+          </a:p>
+          <a:p>
             <a:r>
               <a:rPr lang="en-US" dirty="0"/>
-              <a:t>there are usually many different solutions to a single problem; here, your aim is to decide on which of those solutions you want</a:t>
-            </a:r>
-            <a:r>
-              <a:rPr lang="en-US" dirty="0" smtClean="0"/>
-              <a:t>.</a:t>
-            </a:r>
-          </a:p>
-          <a:p>
-            <a:r>
-              <a:rPr lang="en-US" dirty="0" smtClean="0"/>
-              <a:t>Therefore</a:t>
-            </a:r>
-            <a:r>
-              <a:rPr lang="en-US" dirty="0"/>
-              <a:t>, you're trying to </a:t>
+              <a:t>Therefore, you're trying to </a:t>
             </a:r>
             <a:r>
               <a:rPr lang="en-US" i="1" dirty="0"/>
@@ -9115,7 +9083,6 @@
               <a:rPr lang="en-US" dirty="0"/>
               <a:t>, in a fairly accurate manner, just what it is your final program will do</a:t>
             </a:r>
-            <a:endParaRPr lang="en-US" dirty="0"/>
           </a:p>
         </p:txBody>
       </p:sp>
@@ -9165,10 +9132,9 @@
           <a:lstStyle/>
           <a:p>
             <a:r>
-              <a:rPr lang="en-US" dirty="0" smtClean="0"/>
+              <a:rPr lang="en-US" dirty="0"/>
               <a:t>Example: Specification</a:t>
             </a:r>
-            <a:endParaRPr lang="en-US" dirty="0"/>
           </a:p>
         </p:txBody>
       </p:sp>
@@ -9189,25 +9155,13 @@
           <a:p>
             <a:r>
               <a:rPr lang="en-US" dirty="0"/>
-              <a:t>For example, for the calculator, we've already decided that the program must allow us to enter simple sums and then must evaluate them correctly and display an </a:t>
-            </a:r>
-            <a:r>
-              <a:rPr lang="en-US" dirty="0" smtClean="0"/>
-              <a:t>answer</a:t>
-            </a:r>
-          </a:p>
-          <a:p>
-            <a:r>
-              <a:rPr lang="en-US" dirty="0" smtClean="0"/>
-              <a:t>We </a:t>
-            </a:r>
+              <a:t>For example, for the calculator, we've already decided that the program must allow us to enter simple sums and then must evaluate them correctly and display an answer</a:t>
+            </a:r>
+          </a:p>
+          <a:p>
             <a:r>
               <a:rPr lang="en-US" dirty="0"/>
-              <a:t>must now tie down exactly what this </a:t>
-            </a:r>
-            <a:r>
-              <a:rPr lang="en-US" dirty="0" smtClean="0"/>
-              <a:t>means</a:t>
+              <a:t>We must now tie down exactly what this means</a:t>
             </a:r>
           </a:p>
           <a:p>
@@ -9215,30 +9169,12 @@
               <a:rPr lang="en-US" dirty="0"/>
               <a:t>Therefore, we have to decide which method of entering sums to use. We could specify any one of a number of methods, but for now, we'll choose a simple method. </a:t>
             </a:r>
-            <a:endParaRPr lang="en-US" dirty="0" smtClean="0"/>
-          </a:p>
-          <a:p>
-            <a:r>
-              <a:rPr lang="en-US" dirty="0" smtClean="0"/>
-              <a:t>We </a:t>
-            </a:r>
+          </a:p>
+          <a:p>
             <a:r>
               <a:rPr lang="en-US" dirty="0"/>
-              <a:t>should also specify what other </a:t>
-            </a:r>
-            <a:r>
-              <a:rPr lang="en-US" dirty="0" smtClean="0"/>
-              <a:t>behavior </a:t>
-            </a:r>
-            <a:r>
-              <a:rPr lang="en-US" dirty="0"/>
-              <a:t>we're expecting the program to </a:t>
-            </a:r>
-            <a:r>
-              <a:rPr lang="en-US" dirty="0" smtClean="0"/>
-              <a:t>have</a:t>
-            </a:r>
-            <a:endParaRPr lang="en-US" dirty="0"/>
+              <a:t>We should also specify what other behavior we're expecting the program to have</a:t>
+            </a:r>
           </a:p>
         </p:txBody>
       </p:sp>
@@ -9289,13 +9225,8 @@
           <a:p>
             <a:r>
               <a:rPr lang="en-US" dirty="0"/>
-              <a:t>Example: </a:t>
-            </a:r>
-            <a:r>
-              <a:rPr lang="en-US" dirty="0" smtClean="0"/>
-              <a:t>Specification (Contd.)</a:t>
-            </a:r>
-            <a:endParaRPr lang="en-US" dirty="0"/>
+              <a:t>Example: Specification (Contd.)</a:t>
+            </a:r>
           </a:p>
         </p:txBody>
       </p:sp>
@@ -9316,7 +9247,7 @@
           </a:bodyPr>
           <a:lstStyle/>
           <a:p>
-            <a:endParaRPr lang="en-US" dirty="0" smtClean="0"/>
+            <a:endParaRPr lang="en-US" dirty="0"/>
           </a:p>
           <a:p>
             <a:r>
@@ -9327,40 +9258,19 @@
           <a:p>
             <a:r>
               <a:rPr lang="en-US" dirty="0"/>
-              <a:t>The program will then display a prompt sign ([number]&gt;) and the user can then type the first number of their sum at the keyboard followed by the RETURN (&lt;-') key</a:t>
-            </a:r>
-            <a:r>
-              <a:rPr lang="en-US" dirty="0" smtClean="0"/>
-              <a:t>.</a:t>
+              <a:t>The program will then display a prompt sign ([number]&gt;) and the user can then type the first number of their sum at the keyboard followed by the RETURN (&lt;-') key.</a:t>
             </a:r>
           </a:p>
           <a:p>
             <a:r>
               <a:rPr lang="en-US" dirty="0"/>
-              <a:t>The program will display a second prompt sign ([+-/*]&gt;) and the user can then enter the operator that they wish to use, followed by RETURN</a:t>
-            </a:r>
-            <a:r>
-              <a:rPr lang="en-US" dirty="0" smtClean="0"/>
-              <a:t>.</a:t>
-            </a:r>
+              <a:t>The program will display a second prompt sign ([+-/*]&gt;) and the user can then enter the operator that they wish to use, followed by RETURN. </a:t>
+            </a:r>
+          </a:p>
+          <a:p>
             <a:r>
               <a:rPr lang="en-US" dirty="0"/>
-              <a:t> </a:t>
-            </a:r>
-            <a:endParaRPr lang="en-US" dirty="0" smtClean="0"/>
-          </a:p>
-          <a:p>
-            <a:r>
-              <a:rPr lang="en-US" dirty="0" smtClean="0"/>
-              <a:t>A </a:t>
-            </a:r>
-            <a:r>
-              <a:rPr lang="en-US" dirty="0"/>
-              <a:t>third prompt sign will be displayed ([number]&gt;) and the user will then enter the second number, again followed by RETURN</a:t>
-            </a:r>
-            <a:r>
-              <a:rPr lang="en-US" dirty="0" smtClean="0"/>
-              <a:t>.</a:t>
+              <a:t>A third prompt sign will be displayed ([number]&gt;) and the user will then enter the second number, again followed by RETURN.</a:t>
             </a:r>
           </a:p>
           <a:p>
@@ -9423,10 +9333,9 @@
           <a:lstStyle/>
           <a:p>
             <a:r>
-              <a:rPr lang="en-US" smtClean="0"/>
+              <a:rPr lang="en-US"/>
               <a:t>2   Outline the Solution</a:t>
             </a:r>
-            <a:endParaRPr lang="en-US"/>
           </a:p>
         </p:txBody>
       </p:sp>
@@ -9446,56 +9355,56 @@
           <a:lstStyle/>
           <a:p>
             <a:r>
-              <a:rPr lang="en-US" smtClean="0"/>
+              <a:rPr lang="en-US"/>
               <a:t>Break the problem into the steps of what must be done to solve the problem: </a:t>
             </a:r>
           </a:p>
           <a:p>
             <a:pPr lvl="1"/>
             <a:r>
-              <a:rPr lang="en-US" smtClean="0"/>
+              <a:rPr lang="en-US"/>
               <a:t>The major processing steps involved</a:t>
             </a:r>
           </a:p>
           <a:p>
             <a:pPr lvl="1"/>
             <a:r>
-              <a:rPr lang="en-US" smtClean="0"/>
+              <a:rPr lang="en-US"/>
               <a:t>The major subtasks (if any)</a:t>
             </a:r>
           </a:p>
           <a:p>
             <a:pPr lvl="1"/>
             <a:r>
-              <a:rPr lang="en-US" smtClean="0"/>
+              <a:rPr lang="en-US"/>
               <a:t>The user interface (if any)</a:t>
             </a:r>
           </a:p>
           <a:p>
             <a:pPr lvl="1"/>
             <a:r>
-              <a:rPr lang="en-US" smtClean="0"/>
+              <a:rPr lang="en-US"/>
               <a:t>The major control structures (e.g. repetition loops)</a:t>
             </a:r>
           </a:p>
           <a:p>
             <a:pPr lvl="1"/>
             <a:r>
-              <a:rPr lang="en-US" smtClean="0"/>
+              <a:rPr lang="en-US"/>
               <a:t>The major variables and record structures</a:t>
             </a:r>
           </a:p>
           <a:p>
             <a:pPr lvl="1"/>
             <a:r>
-              <a:rPr lang="en-US" smtClean="0"/>
+              <a:rPr lang="en-US"/>
               <a:t>The mainline logic</a:t>
             </a:r>
           </a:p>
           <a:p>
             <a:pPr lvl="1"/>
             <a:r>
-              <a:rPr lang="en-US" smtClean="0"/>
+              <a:rPr lang="en-US"/>
               <a:t>Tools: Hierarchy or Structure charts</a:t>
             </a:r>
             <a:endParaRPr lang="en-US" dirty="0"/>
@@ -9512,13 +9421,6 @@
   <p:clrMapOvr>
     <a:masterClrMapping/>
   </p:clrMapOvr>
-  <p:timing>
-    <p:tnLst>
-      <p:par>
-        <p:cTn id="1" dur="indefinite" restart="never" nodeType="tmRoot"/>
-      </p:par>
-    </p:tnLst>
-  </p:timing>
 </p:sld>
 </file>
 
@@ -9555,10 +9457,9 @@
           <a:lstStyle/>
           <a:p>
             <a:r>
-              <a:rPr lang="en-US" dirty="0" smtClean="0"/>
+              <a:rPr lang="en-US" dirty="0"/>
               <a:t>Designing the solution</a:t>
             </a:r>
-            <a:endParaRPr lang="en-US" dirty="0"/>
           </a:p>
         </p:txBody>
       </p:sp>
@@ -9589,43 +9490,14 @@
             </a:r>
             <a:r>
               <a:rPr lang="en-US" dirty="0"/>
-              <a:t> you're going to turn that specification into a working program</a:t>
-            </a:r>
-            <a:r>
-              <a:rPr lang="en-US" dirty="0" smtClean="0"/>
-              <a:t>.</a:t>
+              <a:t> you're going to turn that specification into a working program.</a:t>
             </a:r>
           </a:p>
           <a:p>
             <a:r>
               <a:rPr lang="en-US" dirty="0"/>
-              <a:t>A</a:t>
-            </a:r>
-            <a:r>
-              <a:rPr lang="en-US" dirty="0" smtClean="0"/>
-              <a:t> </a:t>
-            </a:r>
-            <a:r>
-              <a:rPr lang="en-US" dirty="0"/>
-              <a:t>program is simply a list of steps describing to the computer what it should </a:t>
-            </a:r>
-            <a:r>
-              <a:rPr lang="en-US" dirty="0" smtClean="0"/>
-              <a:t>do</a:t>
-            </a:r>
-            <a:r>
-              <a:rPr lang="en-US" dirty="0"/>
-              <a:t> </a:t>
-            </a:r>
-            <a:r>
-              <a:rPr lang="en-US" dirty="0" smtClean="0"/>
-              <a:t>whereas a </a:t>
-            </a:r>
-            <a:r>
-              <a:rPr lang="en-US" dirty="0"/>
-              <a:t>design is simply a higher-level description of those steps. </a:t>
-            </a:r>
-            <a:endParaRPr lang="en-US" dirty="0" smtClean="0"/>
+              <a:t>A program is simply a list of steps describing to the computer what it should do whereas a design is simply a higher-level description of those steps. </a:t>
+            </a:r>
           </a:p>
           <a:p>
             <a:r>
@@ -9687,10 +9559,9 @@
           <a:lstStyle/>
           <a:p>
             <a:r>
-              <a:rPr lang="en-US" dirty="0" smtClean="0"/>
+              <a:rPr lang="en-US" dirty="0"/>
               <a:t>Designing the solution (Contd.)</a:t>
             </a:r>
-            <a:endParaRPr lang="en-US" dirty="0"/>
           </a:p>
         </p:txBody>
       </p:sp>
@@ -9712,12 +9583,8 @@
           <a:lstStyle/>
           <a:p>
             <a:r>
-              <a:rPr lang="en-US" dirty="0" smtClean="0"/>
-              <a:t>Working </a:t>
-            </a:r>
-            <a:r>
               <a:rPr lang="en-US" dirty="0"/>
-              <a:t>out a design to fulfil a particular specification can be difficult for several reasons:</a:t>
+              <a:t>Working out a design to fulfil a particular specification can be difficult for several reasons:</a:t>
             </a:r>
           </a:p>
           <a:p>
@@ -9792,10 +9659,9 @@
           <a:lstStyle/>
           <a:p>
             <a:r>
-              <a:rPr lang="en-US" smtClean="0"/>
+              <a:rPr lang="en-US"/>
               <a:t>3   Develop the Outline into an Algorithm</a:t>
             </a:r>
-            <a:endParaRPr lang="en-US"/>
           </a:p>
         </p:txBody>
       </p:sp>
@@ -9815,22 +9681,21 @@
           <a:lstStyle/>
           <a:p>
             <a:r>
-              <a:rPr lang="en-US" smtClean="0"/>
+              <a:rPr lang="en-US"/>
               <a:t>The solution outline developed in Step 2 is expanded into an algorithm: </a:t>
             </a:r>
           </a:p>
           <a:p>
             <a:r>
-              <a:rPr lang="en-US" smtClean="0"/>
+              <a:rPr lang="en-US"/>
               <a:t>It should list all the steps that need to be done, in the correct order they need to be done in. </a:t>
             </a:r>
           </a:p>
           <a:p>
             <a:r>
-              <a:rPr lang="en-US" smtClean="0"/>
+              <a:rPr lang="en-US"/>
               <a:t>Tools: Pseudocode, Flowcharts, Nassi-Schneiderman diagrams</a:t>
             </a:r>
-            <a:endParaRPr lang="en-US"/>
           </a:p>
         </p:txBody>
       </p:sp>
@@ -9844,13 +9709,6 @@
   <p:clrMapOvr>
     <a:masterClrMapping/>
   </p:clrMapOvr>
-  <p:timing>
-    <p:tnLst>
-      <p:par>
-        <p:cTn id="1" dur="indefinite" restart="never" nodeType="tmRoot"/>
-      </p:par>
-    </p:tnLst>
-  </p:timing>
 </p:sld>
 </file>
 
@@ -9887,10 +9745,9 @@
           <a:lstStyle/>
           <a:p>
             <a:r>
-              <a:rPr lang="en-US" dirty="0" smtClean="0"/>
+              <a:rPr lang="en-US" dirty="0"/>
               <a:t>Example: Algorithm</a:t>
             </a:r>
-            <a:endParaRPr lang="en-US" dirty="0"/>
           </a:p>
         </p:txBody>
       </p:sp>
@@ -9918,7 +9775,6 @@
               <a:rPr lang="en-US" dirty="0"/>
               <a:t>For our calculator, we have a fairly comprehensive specification and since it is a fairly simple program we can turn the that quite easily into a design:</a:t>
             </a:r>
-            <a:endParaRPr lang="en-US" dirty="0"/>
           </a:p>
         </p:txBody>
       </p:sp>
@@ -10034,10 +9890,9 @@
           <a:lstStyle/>
           <a:p>
             <a:r>
-              <a:rPr lang="en-US" smtClean="0"/>
+              <a:rPr lang="en-US"/>
               <a:t>4   Test the Algorithm for Correctness</a:t>
             </a:r>
-            <a:endParaRPr lang="en-US"/>
           </a:p>
         </p:txBody>
       </p:sp>
@@ -10057,22 +9912,21 @@
           <a:lstStyle/>
           <a:p>
             <a:r>
-              <a:rPr lang="en-US" smtClean="0"/>
+              <a:rPr lang="en-US"/>
               <a:t>In this step, you pretend to be a computer and execute the steps in the algorithm. This is called "Desk Checking." </a:t>
             </a:r>
           </a:p>
           <a:p>
             <a:r>
-              <a:rPr lang="en-US" smtClean="0"/>
+              <a:rPr lang="en-US"/>
               <a:t>This step is one of the most important in the development of a program, and yet it is the step most often forgotten</a:t>
             </a:r>
           </a:p>
           <a:p>
             <a:r>
-              <a:rPr lang="en-US" smtClean="0"/>
+              <a:rPr lang="en-US"/>
               <a:t>The main purpose of desk checking the algorithm is to identify major logic errors early, so that they may be easily corrected</a:t>
             </a:r>
-            <a:endParaRPr lang="en-US"/>
           </a:p>
         </p:txBody>
       </p:sp>
@@ -10086,13 +9940,6 @@
   <p:clrMapOvr>
     <a:masterClrMapping/>
   </p:clrMapOvr>
-  <p:timing>
-    <p:tnLst>
-      <p:par>
-        <p:cTn id="1" dur="indefinite" restart="never" nodeType="tmRoot"/>
-      </p:par>
-    </p:tnLst>
-  </p:timing>
 </p:sld>
 </file>
 
@@ -10129,10 +9976,9 @@
           <a:lstStyle/>
           <a:p>
             <a:r>
-              <a:rPr lang="en-US" dirty="0" smtClean="0"/>
+              <a:rPr lang="en-US" dirty="0"/>
               <a:t>Programming</a:t>
             </a:r>
-            <a:endParaRPr lang="en-US" dirty="0"/>
           </a:p>
         </p:txBody>
       </p:sp>
@@ -10153,11 +9999,7 @@
           <a:p>
             <a:r>
               <a:rPr lang="en-US" dirty="0"/>
-              <a:t>Programming is then the task of describing your design to the computer: teaching it your way of solving the problem</a:t>
-            </a:r>
-            <a:r>
-              <a:rPr lang="en-US" dirty="0" smtClean="0"/>
-              <a:t>.</a:t>
+              <a:t>Programming is then the task of describing your design to the computer: teaching it your way of solving the problem.</a:t>
             </a:r>
           </a:p>
           <a:p>
@@ -10183,7 +10025,7 @@
           <a:p>
             <a:pPr lvl="1"/>
             <a:r>
-              <a:rPr lang="en-US" dirty="0" smtClean="0"/>
+              <a:rPr lang="en-US" dirty="0"/>
               <a:t>Debugging</a:t>
             </a:r>
           </a:p>
@@ -10239,22 +10081,14 @@
           </a:bodyPr>
           <a:lstStyle/>
           <a:p>
-            <a:r>
-              <a:rPr lang="en-US" smtClean="0"/>
-              <a:t/>
-            </a:r>
             <a:br>
-              <a:rPr lang="en-US" smtClean="0"/>
+              <a:rPr lang="en-US"/>
             </a:br>
-            <a:r>
-              <a:rPr lang="en-US" smtClean="0"/>
-              <a:t/>
-            </a:r>
             <a:br>
-              <a:rPr lang="en-US" smtClean="0"/>
+              <a:rPr lang="en-US"/>
             </a:br>
             <a:r>
-              <a:rPr lang="en-US" smtClean="0"/>
+              <a:rPr lang="en-US"/>
               <a:t>Important steps in Programming</a:t>
             </a:r>
             <a:endParaRPr lang="en-US" dirty="0"/>
@@ -10320,13 +10154,6 @@
   <p:clrMapOvr>
     <a:masterClrMapping/>
   </p:clrMapOvr>
-  <p:timing>
-    <p:tnLst>
-      <p:par>
-        <p:cTn id="1" dur="indefinite" restart="never" nodeType="tmRoot"/>
-      </p:par>
-    </p:tnLst>
-  </p:timing>
 </p:sld>
 </file>
 
@@ -10363,22 +10190,9 @@
           <a:lstStyle/>
           <a:p>
             <a:r>
-              <a:rPr lang="en-US" dirty="0" smtClean="0"/>
-              <a:t>5   </a:t>
-            </a:r>
-            <a:r>
               <a:rPr lang="en-US" dirty="0"/>
-              <a:t>Building Algorithms </a:t>
-            </a:r>
-            <a:r>
-              <a:rPr lang="en-US" dirty="0" smtClean="0"/>
-              <a:t>into a Specific Programming </a:t>
-            </a:r>
-            <a:r>
-              <a:rPr lang="en-US" dirty="0" smtClean="0"/>
-              <a:t>Language (Coding)</a:t>
-            </a:r>
-            <a:endParaRPr lang="en-US" dirty="0"/>
+              <a:t>5   Building Algorithms into a Specific Programming Language (Coding)</a:t>
+            </a:r>
           </a:p>
         </p:txBody>
       </p:sp>
@@ -10398,17 +10212,16 @@
           <a:lstStyle/>
           <a:p>
             <a:r>
-              <a:rPr lang="en-US" dirty="0" smtClean="0"/>
+              <a:rPr lang="en-US" dirty="0"/>
               <a:t>Once the algorithm, or complete outline works correctly, you need to translate the algorithm into a computer language that your computer understands. </a:t>
             </a:r>
           </a:p>
           <a:p>
             <a:pPr lvl="1"/>
             <a:r>
-              <a:rPr lang="en-US" dirty="0" smtClean="0"/>
+              <a:rPr lang="en-US" dirty="0"/>
               <a:t>This is only 5 to 10% of the total programming process!</a:t>
             </a:r>
-            <a:endParaRPr lang="en-US" dirty="0"/>
           </a:p>
         </p:txBody>
       </p:sp>
@@ -10422,13 +10235,6 @@
   <p:clrMapOvr>
     <a:masterClrMapping/>
   </p:clrMapOvr>
-  <p:timing>
-    <p:tnLst>
-      <p:par>
-        <p:cTn id="1" dur="indefinite" restart="never" nodeType="tmRoot"/>
-      </p:par>
-    </p:tnLst>
-  </p:timing>
 </p:sld>
 </file>
 
@@ -10465,10 +10271,9 @@
           <a:lstStyle/>
           <a:p>
             <a:r>
-              <a:rPr lang="en-US" dirty="0" smtClean="0"/>
+              <a:rPr lang="en-US" dirty="0"/>
               <a:t>Coding</a:t>
             </a:r>
-            <a:endParaRPr lang="en-US" dirty="0"/>
           </a:p>
         </p:txBody>
       </p:sp>
@@ -10495,32 +10300,14 @@
           <a:p>
             <a:r>
               <a:rPr lang="en-US" dirty="0"/>
-              <a:t>Coding is a little bit like writing an essay (but don't let that put you off). In most cases you write your program using something a bit like a word processor. And, like essays, there are certain things that you always need to </a:t>
-            </a:r>
-            <a:r>
-              <a:rPr lang="en-US" dirty="0" smtClean="0"/>
-              <a:t>include </a:t>
-            </a:r>
+              <a:t>Coding is a little bit like writing an essay (but don't let that put you off). In most cases you write your program using something a bit like a word processor. And, like essays, there are certain things that you always need to include in your program (a bit like titles, contents pages, introductions, references etc.). </a:t>
+            </a:r>
+          </a:p>
+          <a:p>
             <a:r>
               <a:rPr lang="en-US" dirty="0"/>
-              <a:t>in your program (a bit like titles, contents pages, introductions, references etc.). </a:t>
-            </a:r>
-            <a:endParaRPr lang="en-US" dirty="0" smtClean="0"/>
-          </a:p>
-          <a:p>
-            <a:r>
-              <a:rPr lang="en-US" dirty="0" smtClean="0"/>
-              <a:t>When </a:t>
-            </a:r>
-            <a:r>
-              <a:rPr lang="en-US" dirty="0"/>
-              <a:t>you've finished translating your design into a program (usually filling in lots of details in the process) you need to submit it to the computer to see what it makes of it</a:t>
-            </a:r>
-            <a:r>
-              <a:rPr lang="en-US" dirty="0" smtClean="0"/>
-              <a:t>.</a:t>
-            </a:r>
-            <a:endParaRPr lang="en-US" dirty="0"/>
+              <a:t>When you've finished translating your design into a program (usually filling in lots of details in the process) you need to submit it to the computer to see what it makes of it.</a:t>
+            </a:r>
           </a:p>
         </p:txBody>
       </p:sp>
@@ -10572,18 +10359,9 @@
           <a:lstStyle/>
           <a:p>
             <a:r>
-              <a:rPr lang="en-US" dirty="0" smtClean="0"/>
-              <a:t>6   </a:t>
-            </a:r>
-            <a:r>
               <a:rPr lang="en-US" dirty="0"/>
-              <a:t>Using Software to Translate the Program into Machine </a:t>
-            </a:r>
-            <a:r>
-              <a:rPr lang="en-US" dirty="0" smtClean="0"/>
-              <a:t>Language (Compiling)</a:t>
-            </a:r>
-            <a:endParaRPr lang="en-US" dirty="0"/>
+              <a:t>6   Using Software to Translate the Program into Machine Language (Compiling)</a:t>
+            </a:r>
           </a:p>
         </p:txBody>
       </p:sp>
@@ -10603,16 +10381,15 @@
           <a:lstStyle/>
           <a:p>
             <a:r>
-              <a:rPr lang="en-US" smtClean="0"/>
+              <a:rPr lang="en-US"/>
               <a:t>This step uses a program compiler and programmer-designed test data to machine test the code for syntax errors (at compile time) and logic errors (at run time)</a:t>
             </a:r>
           </a:p>
           <a:p>
             <a:r>
-              <a:rPr lang="en-US" smtClean="0"/>
+              <a:rPr lang="en-US"/>
               <a:t>You enter the program into the computer's memory, enter the input data, and have the computer execute the program. If you get the correct answer to the problem, the program works! Otherwise, look for errors in the program and try again.</a:t>
             </a:r>
-            <a:endParaRPr lang="en-US"/>
           </a:p>
         </p:txBody>
       </p:sp>
@@ -10626,13 +10403,6 @@
   <p:clrMapOvr>
     <a:masterClrMapping/>
   </p:clrMapOvr>
-  <p:timing>
-    <p:tnLst>
-      <p:par>
-        <p:cTn id="1" dur="indefinite" restart="never" nodeType="tmRoot"/>
-      </p:par>
-    </p:tnLst>
-  </p:timing>
 </p:sld>
 </file>
 
@@ -10669,10 +10439,9 @@
           <a:lstStyle/>
           <a:p>
             <a:r>
-              <a:rPr lang="en-US" dirty="0" smtClean="0"/>
+              <a:rPr lang="en-US" dirty="0"/>
               <a:t>Compiling</a:t>
             </a:r>
-            <a:endParaRPr lang="en-US" dirty="0"/>
           </a:p>
         </p:txBody>
       </p:sp>
@@ -10692,23 +10461,14 @@
           <a:lstStyle/>
           <a:p>
             <a:r>
-              <a:rPr lang="en-US" dirty="0" smtClean="0"/>
-              <a:t>Compilation </a:t>
-            </a:r>
-            <a:r>
               <a:rPr lang="en-US" dirty="0"/>
-              <a:t>is actually the process of turning the program written in some programming language into the instructions made up of 0's and 1's that the computer can actually follow. </a:t>
-            </a:r>
-            <a:endParaRPr lang="en-US" dirty="0" smtClean="0"/>
-          </a:p>
-          <a:p>
-            <a:r>
-              <a:rPr lang="en-US" dirty="0" smtClean="0"/>
-              <a:t>This </a:t>
-            </a:r>
+              <a:t>Compilation is actually the process of turning the program written in some programming language into the instructions made up of 0's and 1's that the computer can actually follow. </a:t>
+            </a:r>
+          </a:p>
+          <a:p>
             <a:r>
               <a:rPr lang="en-US" dirty="0"/>
-              <a:t>is necessary because the chip that makes your computer work only understands binary machine code - something that most humans would have a great deal of trouble using since it looks something like:</a:t>
+              <a:t>This is necessary because the chip that makes your computer work only understands binary machine code - something that most humans would have a great deal of trouble using since it looks something like:</a:t>
             </a:r>
           </a:p>
           <a:p>
@@ -10786,10 +10546,9 @@
           <a:lstStyle/>
           <a:p>
             <a:r>
-              <a:rPr lang="en-US" dirty="0" smtClean="0"/>
+              <a:rPr lang="en-US" dirty="0"/>
               <a:t>Debugging</a:t>
             </a:r>
-            <a:endParaRPr lang="en-US" dirty="0"/>
           </a:p>
         </p:txBody>
       </p:sp>
@@ -10810,11 +10569,7 @@
           <a:p>
             <a:r>
               <a:rPr lang="en-US" dirty="0"/>
-              <a:t>This is where debugging makes it first appearance, since once the compiler has looked at your program it is likely to come back to you with a list of mistakes as long as your arm</a:t>
-            </a:r>
-            <a:r>
-              <a:rPr lang="en-US" dirty="0" smtClean="0"/>
-              <a:t>.</a:t>
+              <a:t>This is where debugging makes it first appearance, since once the compiler has looked at your program it is likely to come back to you with a list of mistakes as long as your arm.</a:t>
             </a:r>
           </a:p>
           <a:p>
@@ -10830,7 +10585,6 @@
               <a:rPr lang="en-US" dirty="0"/>
               <a:t> times before the compiler is happy with it.</a:t>
             </a:r>
-            <a:endParaRPr lang="en-US" dirty="0"/>
           </a:p>
         </p:txBody>
       </p:sp>
@@ -10880,10 +10634,9 @@
           <a:lstStyle/>
           <a:p>
             <a:r>
-              <a:rPr lang="en-US" dirty="0" smtClean="0"/>
+              <a:rPr lang="en-US" dirty="0"/>
               <a:t>Testing</a:t>
             </a:r>
-            <a:endParaRPr lang="en-US" dirty="0"/>
           </a:p>
         </p:txBody>
       </p:sp>
@@ -10908,20 +10661,11 @@
               <a:rPr lang="en-US" dirty="0"/>
               <a:t>The final step in the grand programming process is that of testing your creation to check that it does what you wanted it to do. </a:t>
             </a:r>
-            <a:endParaRPr lang="en-US" dirty="0" smtClean="0"/>
-          </a:p>
-          <a:p>
-            <a:r>
-              <a:rPr lang="en-US" dirty="0" smtClean="0"/>
-              <a:t>This </a:t>
-            </a:r>
+          </a:p>
+          <a:p>
             <a:r>
               <a:rPr lang="en-US" dirty="0"/>
-              <a:t>step is unfortunately necessary because although the compiler has checked that your program is correctly written, it can't check whether what you've written actually solves your original problem</a:t>
-            </a:r>
-            <a:r>
-              <a:rPr lang="en-US" dirty="0" smtClean="0"/>
-              <a:t>.</a:t>
+              <a:t>This step is unfortunately necessary because although the compiler has checked that your program is correctly written, it can't check whether what you've written actually solves your original problem.</a:t>
             </a:r>
           </a:p>
           <a:p>
@@ -10937,31 +10681,20 @@
               <a:rPr lang="en-US" dirty="0"/>
               <a:t> correct) but at the same time be utter nonsense (semantically incorrect). </a:t>
             </a:r>
-            <a:endParaRPr lang="en-US" dirty="0" smtClean="0"/>
           </a:p>
           <a:p>
             <a:pPr lvl="1"/>
             <a:r>
-              <a:rPr lang="en-US" dirty="0" smtClean="0"/>
-              <a:t>For </a:t>
-            </a:r>
-            <a:r>
               <a:rPr lang="en-US" dirty="0"/>
-              <a:t>example, 'Fish trousers go sideways.' is a great sentence - it's got a capital letter and a full stop - but it doesn't mean a lot. </a:t>
-            </a:r>
-            <a:endParaRPr lang="en-US" dirty="0" smtClean="0"/>
+              <a:t>For example, 'Fish trousers go sideways.' is a great sentence - it's got a capital letter and a full stop - but it doesn't mean a lot. </a:t>
+            </a:r>
           </a:p>
           <a:p>
             <a:pPr lvl="1"/>
             <a:r>
-              <a:rPr lang="en-US" dirty="0" smtClean="0"/>
-              <a:t>Similarly</a:t>
-            </a:r>
-            <a:r>
               <a:rPr lang="en-US" dirty="0"/>
-              <a:t>, 'Put the ice cube tray in the oven.' has verbs and nouns and so on - but it's pretty useless if you wanted to make ice cubes</a:t>
-            </a:r>
-            <a:endParaRPr lang="en-US" dirty="0"/>
+              <a:t>Similarly, 'Put the ice cube tray in the oven.' has verbs and nouns and so on - but it's pretty useless if you wanted to make ice cubes</a:t>
+            </a:r>
           </a:p>
         </p:txBody>
       </p:sp>
@@ -11011,10 +10744,9 @@
           <a:lstStyle/>
           <a:p>
             <a:r>
-              <a:rPr lang="en-US" dirty="0" smtClean="0"/>
+              <a:rPr lang="en-US" dirty="0"/>
               <a:t>Testing (Contd.)</a:t>
             </a:r>
-            <a:endParaRPr lang="en-US" dirty="0"/>
           </a:p>
         </p:txBody>
       </p:sp>
@@ -11037,18 +10769,12 @@
               <a:rPr lang="en-US" dirty="0"/>
               <a:t>So your program needs to be tested, and this is often initially done informally (or perhaps, haphazardly) by running it and playing with it for a bit to see if it seems to be working correctly. </a:t>
             </a:r>
-            <a:endParaRPr lang="en-US" dirty="0" smtClean="0"/>
-          </a:p>
-          <a:p>
-            <a:r>
-              <a:rPr lang="en-US" dirty="0" smtClean="0"/>
-              <a:t>After </a:t>
-            </a:r>
+          </a:p>
+          <a:p>
             <a:r>
               <a:rPr lang="en-US" dirty="0"/>
-              <a:t>this has been done, it should also be checked more thoroughly by subjecting it to carefully worked out set of tests that put it through its paces, and check that it meets the requirements and specification</a:t>
-            </a:r>
-            <a:endParaRPr lang="en-US" dirty="0"/>
+              <a:t>After this has been done, it should also be checked more thoroughly by subjecting it to carefully worked out set of tests that put it through its paces, and check that it meets the requirements and specification</a:t>
+            </a:r>
           </a:p>
         </p:txBody>
       </p:sp>
@@ -11098,10 +10824,9 @@
           <a:lstStyle/>
           <a:p>
             <a:r>
-              <a:rPr lang="en-US" smtClean="0"/>
+              <a:rPr lang="en-US"/>
               <a:t>7   Document and Maintain the Program</a:t>
             </a:r>
-            <a:endParaRPr lang="en-US"/>
           </a:p>
         </p:txBody>
       </p:sp>
@@ -11121,30 +10846,29 @@
           <a:lstStyle/>
           <a:p>
             <a:r>
-              <a:rPr lang="en-US" smtClean="0"/>
+              <a:rPr lang="en-US"/>
               <a:t>Warning! The Documentation of the program started by writing down "What is the Problem!" It continues through each step of the design process.</a:t>
             </a:r>
           </a:p>
           <a:p>
             <a:r>
-              <a:rPr lang="en-US" smtClean="0"/>
+              <a:rPr lang="en-US"/>
               <a:t>Documentation involves:</a:t>
             </a:r>
           </a:p>
           <a:p>
             <a:pPr lvl="1"/>
             <a:r>
-              <a:rPr lang="en-US" smtClean="0"/>
+              <a:rPr lang="en-US"/>
               <a:t>external documentation</a:t>
             </a:r>
           </a:p>
           <a:p>
             <a:pPr lvl="1"/>
             <a:r>
-              <a:rPr lang="en-US" smtClean="0"/>
+              <a:rPr lang="en-US"/>
               <a:t>internal documentation that may have been coded in the program</a:t>
             </a:r>
-            <a:endParaRPr lang="en-US"/>
           </a:p>
         </p:txBody>
       </p:sp>
@@ -11158,13 +10882,6 @@
   <p:clrMapOvr>
     <a:masterClrMapping/>
   </p:clrMapOvr>
-  <p:timing>
-    <p:tnLst>
-      <p:par>
-        <p:cTn id="1" dur="indefinite" restart="never" nodeType="tmRoot"/>
-      </p:par>
-    </p:tnLst>
-  </p:timing>
 </p:sld>
 </file>
 
@@ -11201,10 +10918,9 @@
           <a:lstStyle/>
           <a:p>
             <a:r>
-              <a:rPr lang="en-US" smtClean="0"/>
+              <a:rPr lang="en-US"/>
               <a:t>Program Design Methodology</a:t>
             </a:r>
-            <a:endParaRPr lang="en-US"/>
           </a:p>
         </p:txBody>
       </p:sp>
@@ -11224,31 +10940,30 @@
           <a:lstStyle/>
           <a:p>
             <a:r>
-              <a:rPr lang="en-US" dirty="0" smtClean="0"/>
+              <a:rPr lang="en-US" dirty="0"/>
               <a:t>Recently, a number of different approaches to program design have emerged, the most common being:</a:t>
             </a:r>
           </a:p>
           <a:p>
             <a:pPr lvl="1"/>
             <a:r>
-              <a:rPr lang="en-US" dirty="0" smtClean="0"/>
+              <a:rPr lang="en-US" dirty="0"/>
               <a:t>Procedure-driven</a:t>
             </a:r>
           </a:p>
           <a:p>
             <a:pPr lvl="1"/>
             <a:r>
-              <a:rPr lang="en-US" dirty="0" smtClean="0"/>
+              <a:rPr lang="en-US" dirty="0"/>
               <a:t>Event-driven</a:t>
             </a:r>
           </a:p>
           <a:p>
             <a:pPr lvl="1"/>
             <a:r>
-              <a:rPr lang="en-US" dirty="0" smtClean="0"/>
+              <a:rPr lang="en-US" dirty="0"/>
               <a:t>Data-driven</a:t>
             </a:r>
-            <a:endParaRPr lang="en-US" dirty="0"/>
           </a:p>
         </p:txBody>
       </p:sp>
@@ -11262,13 +10977,6 @@
   <p:clrMapOvr>
     <a:masterClrMapping/>
   </p:clrMapOvr>
-  <p:timing>
-    <p:tnLst>
-      <p:par>
-        <p:cTn id="1" dur="indefinite" restart="never" nodeType="tmRoot"/>
-      </p:par>
-    </p:tnLst>
-  </p:timing>
 </p:sld>
 </file>
 
@@ -11305,10 +11013,9 @@
           <a:lstStyle/>
           <a:p>
             <a:r>
-              <a:rPr lang="en-US" smtClean="0"/>
+              <a:rPr lang="en-US"/>
               <a:t>Procedure-Driven Program Design</a:t>
             </a:r>
-            <a:endParaRPr lang="en-US"/>
           </a:p>
         </p:txBody>
       </p:sp>
@@ -11328,10 +11035,9 @@
           <a:lstStyle/>
           <a:p>
             <a:r>
-              <a:rPr lang="en-US" smtClean="0"/>
+              <a:rPr lang="en-US"/>
               <a:t>The procedure-driven approach to program design is based on the idea that the most important feature of a program is ‘what’ it does – that is, its processes or functions</a:t>
             </a:r>
-            <a:endParaRPr lang="en-US"/>
           </a:p>
         </p:txBody>
       </p:sp>
@@ -11345,13 +11051,6 @@
   <p:clrMapOvr>
     <a:masterClrMapping/>
   </p:clrMapOvr>
-  <p:timing>
-    <p:tnLst>
-      <p:par>
-        <p:cTn id="1" dur="indefinite" restart="never" nodeType="tmRoot"/>
-      </p:par>
-    </p:tnLst>
-  </p:timing>
 </p:sld>
 </file>
 
@@ -11388,10 +11087,9 @@
           <a:lstStyle/>
           <a:p>
             <a:r>
-              <a:rPr lang="en-US" smtClean="0"/>
+              <a:rPr lang="en-US"/>
               <a:t>Program Design</a:t>
             </a:r>
-            <a:endParaRPr lang="en-US"/>
           </a:p>
         </p:txBody>
       </p:sp>
@@ -11411,10 +11109,9 @@
           <a:lstStyle/>
           <a:p>
             <a:r>
-              <a:rPr lang="en-US" smtClean="0"/>
+              <a:rPr lang="en-US"/>
               <a:t>Most good programs require good planning before they are written. This is called Program Design.</a:t>
             </a:r>
-            <a:endParaRPr lang="en-US"/>
           </a:p>
         </p:txBody>
       </p:sp>
@@ -11454,13 +11151,6 @@
   <p:clrMapOvr>
     <a:masterClrMapping/>
   </p:clrMapOvr>
-  <p:timing>
-    <p:tnLst>
-      <p:par>
-        <p:cTn id="1" dur="indefinite" restart="never" nodeType="tmRoot"/>
-      </p:par>
-    </p:tnLst>
-  </p:timing>
 </p:sld>
 </file>
 
@@ -11497,10 +11187,9 @@
           <a:lstStyle/>
           <a:p>
             <a:r>
-              <a:rPr lang="en-US" smtClean="0"/>
+              <a:rPr lang="en-US"/>
               <a:t>Procedure-Driven Program Design</a:t>
             </a:r>
-            <a:endParaRPr lang="en-US"/>
           </a:p>
         </p:txBody>
       </p:sp>
@@ -11520,37 +11209,36 @@
           <a:lstStyle/>
           <a:p>
             <a:r>
-              <a:rPr lang="en-US" smtClean="0"/>
+              <a:rPr lang="en-US"/>
               <a:t>Example</a:t>
             </a:r>
           </a:p>
           <a:p>
             <a:r>
-              <a:rPr lang="en-US" smtClean="0"/>
+              <a:rPr lang="en-US"/>
               <a:t>A program to execute a sales order may be divided into:</a:t>
             </a:r>
           </a:p>
           <a:p>
             <a:pPr lvl="1"/>
             <a:r>
-              <a:rPr lang="en-US" smtClean="0"/>
+              <a:rPr lang="en-US"/>
               <a:t>order entry module </a:t>
             </a:r>
           </a:p>
           <a:p>
             <a:pPr lvl="1"/>
             <a:r>
-              <a:rPr lang="en-US" smtClean="0"/>
+              <a:rPr lang="en-US"/>
               <a:t>data verification module </a:t>
             </a:r>
           </a:p>
           <a:p>
             <a:pPr lvl="1"/>
             <a:r>
-              <a:rPr lang="en-US" smtClean="0"/>
+              <a:rPr lang="en-US"/>
               <a:t>Inventory update module</a:t>
             </a:r>
-            <a:endParaRPr lang="en-US"/>
           </a:p>
         </p:txBody>
       </p:sp>
@@ -11564,13 +11252,6 @@
   <p:clrMapOvr>
     <a:masterClrMapping/>
   </p:clrMapOvr>
-  <p:timing>
-    <p:tnLst>
-      <p:par>
-        <p:cTn id="1" dur="indefinite" restart="never" nodeType="tmRoot"/>
-      </p:par>
-    </p:tnLst>
-  </p:timing>
 </p:sld>
 </file>
 
@@ -11607,10 +11288,9 @@
           <a:lstStyle/>
           <a:p>
             <a:r>
-              <a:rPr lang="en-US" smtClean="0"/>
+              <a:rPr lang="en-US"/>
               <a:t>Procedure-Driven Program Design</a:t>
             </a:r>
-            <a:endParaRPr lang="en-US"/>
           </a:p>
         </p:txBody>
       </p:sp>
@@ -11630,17 +11310,16 @@
           <a:lstStyle/>
           <a:p>
             <a:r>
-              <a:rPr lang="en-US" smtClean="0"/>
+              <a:rPr lang="en-US"/>
               <a:t>In procedure-driven programming, the sequence of operations for an application is determined by a central controlling program (e.g., a main procedure).</a:t>
             </a:r>
           </a:p>
           <a:p>
             <a:pPr lvl="1"/>
             <a:r>
-              <a:rPr lang="en-US" smtClean="0"/>
+              <a:rPr lang="en-US"/>
               <a:t>The program determines in advance what will be done and in which order. The program starts at the beginning, occasionally calls subroutines </a:t>
             </a:r>
-            <a:endParaRPr lang="en-US"/>
           </a:p>
         </p:txBody>
       </p:sp>
@@ -11654,13 +11333,6 @@
   <p:clrMapOvr>
     <a:masterClrMapping/>
   </p:clrMapOvr>
-  <p:timing>
-    <p:tnLst>
-      <p:par>
-        <p:cTn id="1" dur="indefinite" restart="never" nodeType="tmRoot"/>
-      </p:par>
-    </p:tnLst>
-  </p:timing>
 </p:sld>
 </file>
 
@@ -11697,10 +11369,9 @@
           <a:lstStyle/>
           <a:p>
             <a:r>
-              <a:rPr lang="en-US" smtClean="0"/>
+              <a:rPr lang="en-US"/>
               <a:t>Event-Driven Program Design</a:t>
             </a:r>
-            <a:endParaRPr lang="en-US"/>
           </a:p>
         </p:txBody>
       </p:sp>
@@ -11720,16 +11391,15 @@
           <a:lstStyle/>
           <a:p>
             <a:r>
-              <a:rPr lang="en-US" smtClean="0"/>
+              <a:rPr lang="en-US"/>
               <a:t>The event-driven approach to program design is based on the idea that an event or interaction with the outside world can cause a program to change from one known state to another</a:t>
             </a:r>
           </a:p>
           <a:p>
             <a:r>
-              <a:rPr lang="en-US" smtClean="0"/>
+              <a:rPr lang="en-US"/>
               <a:t>In event-driven programming the code responds to a system-generated event, such as a button-push or a clock cycle. </a:t>
             </a:r>
-            <a:endParaRPr lang="en-US"/>
           </a:p>
         </p:txBody>
       </p:sp>
@@ -11743,13 +11413,6 @@
   <p:clrMapOvr>
     <a:masterClrMapping/>
   </p:clrMapOvr>
-  <p:timing>
-    <p:tnLst>
-      <p:par>
-        <p:cTn id="1" dur="indefinite" restart="never" nodeType="tmRoot"/>
-      </p:par>
-    </p:tnLst>
-  </p:timing>
 </p:sld>
 </file>
 
@@ -11786,10 +11449,9 @@
           <a:lstStyle/>
           <a:p>
             <a:r>
-              <a:rPr lang="en-US" smtClean="0"/>
+              <a:rPr lang="en-US"/>
               <a:t>Data-Driven Program Design</a:t>
             </a:r>
-            <a:endParaRPr lang="en-US"/>
           </a:p>
         </p:txBody>
       </p:sp>
@@ -11809,22 +11471,21 @@
           <a:lstStyle/>
           <a:p>
             <a:r>
-              <a:rPr lang="en-US" smtClean="0"/>
+              <a:rPr lang="en-US"/>
               <a:t>The data-driven approach to program design is based on the idea that the data in a program is more stable than the processes involved</a:t>
             </a:r>
           </a:p>
           <a:p>
             <a:r>
-              <a:rPr lang="en-US" smtClean="0"/>
+              <a:rPr lang="en-US"/>
               <a:t>It begins with an analysis of the data and the relationships between the data, in order to determine the fundamental data structures</a:t>
             </a:r>
           </a:p>
           <a:p>
             <a:r>
-              <a:rPr lang="en-US" smtClean="0"/>
+              <a:rPr lang="en-US"/>
               <a:t>The choice between procedure-driven, event-driven, or data-driven program design methodologies is usually determined by the selection of a programming language</a:t>
             </a:r>
-            <a:endParaRPr lang="en-US"/>
           </a:p>
         </p:txBody>
       </p:sp>
@@ -11838,13 +11499,6 @@
   <p:clrMapOvr>
     <a:masterClrMapping/>
   </p:clrMapOvr>
-  <p:timing>
-    <p:tnLst>
-      <p:par>
-        <p:cTn id="1" dur="indefinite" restart="never" nodeType="tmRoot"/>
-      </p:par>
-    </p:tnLst>
-  </p:timing>
 </p:sld>
 </file>
 
@@ -11881,10 +11535,9 @@
           <a:lstStyle/>
           <a:p>
             <a:r>
-              <a:rPr lang="en-US" smtClean="0"/>
+              <a:rPr lang="en-US"/>
               <a:t>Procedural versus Object-Oriented Programming</a:t>
             </a:r>
-            <a:endParaRPr lang="en-US"/>
           </a:p>
         </p:txBody>
       </p:sp>
@@ -11904,30 +11557,29 @@
           <a:lstStyle/>
           <a:p>
             <a:r>
-              <a:rPr lang="en-US" smtClean="0"/>
+              <a:rPr lang="en-US"/>
               <a:t>Procedural programming is based on a structured, top-down approach to writing effective programs</a:t>
             </a:r>
           </a:p>
           <a:p>
             <a:r>
-              <a:rPr lang="en-US" smtClean="0"/>
+              <a:rPr lang="en-US"/>
               <a:t>In the top-down development of a program design:</a:t>
             </a:r>
           </a:p>
           <a:p>
             <a:pPr lvl="1"/>
             <a:r>
-              <a:rPr lang="en-US" smtClean="0"/>
+              <a:rPr lang="en-US"/>
               <a:t>a general solution to the problem is outlined first</a:t>
             </a:r>
           </a:p>
           <a:p>
             <a:pPr lvl="1"/>
             <a:r>
-              <a:rPr lang="en-US" smtClean="0"/>
+              <a:rPr lang="en-US"/>
               <a:t>the general solution is then broken down gradually into more detailed steps until finally the most detailed levels have been completed</a:t>
             </a:r>
-            <a:endParaRPr lang="en-US"/>
           </a:p>
         </p:txBody>
       </p:sp>
@@ -11941,13 +11593,6 @@
   <p:clrMapOvr>
     <a:masterClrMapping/>
   </p:clrMapOvr>
-  <p:timing>
-    <p:tnLst>
-      <p:par>
-        <p:cTn id="1" dur="indefinite" restart="never" nodeType="tmRoot"/>
-      </p:par>
-    </p:tnLst>
-  </p:timing>
 </p:sld>
 </file>
 
@@ -11984,10 +11629,9 @@
           <a:lstStyle/>
           <a:p>
             <a:r>
-              <a:rPr lang="en-US" smtClean="0"/>
+              <a:rPr lang="en-US"/>
               <a:t>Modular Design</a:t>
             </a:r>
-            <a:endParaRPr lang="en-US"/>
           </a:p>
         </p:txBody>
       </p:sp>
@@ -12007,16 +11651,15 @@
           <a:lstStyle/>
           <a:p>
             <a:r>
-              <a:rPr lang="en-US" smtClean="0"/>
+              <a:rPr lang="en-US"/>
               <a:t>Procedural programming also incorporates the concept of modular design, which involves grouping tasks together because they all perform the same function</a:t>
             </a:r>
           </a:p>
           <a:p>
             <a:r>
-              <a:rPr lang="en-US" smtClean="0"/>
+              <a:rPr lang="en-US"/>
               <a:t>Modular design is connected directly to top-down development</a:t>
             </a:r>
-            <a:endParaRPr lang="en-US"/>
           </a:p>
         </p:txBody>
       </p:sp>
@@ -12030,13 +11673,6 @@
   <p:clrMapOvr>
     <a:masterClrMapping/>
   </p:clrMapOvr>
-  <p:timing>
-    <p:tnLst>
-      <p:par>
-        <p:cTn id="1" dur="indefinite" restart="never" nodeType="tmRoot"/>
-      </p:par>
-    </p:tnLst>
-  </p:timing>
 </p:sld>
 </file>
 
@@ -12073,10 +11709,9 @@
           <a:lstStyle/>
           <a:p>
             <a:r>
-              <a:rPr lang="en-US" smtClean="0"/>
+              <a:rPr lang="en-US"/>
               <a:t>Object-Oriented Programming</a:t>
             </a:r>
-            <a:endParaRPr lang="en-US"/>
           </a:p>
         </p:txBody>
       </p:sp>
@@ -12096,10 +11731,9 @@
           <a:lstStyle/>
           <a:p>
             <a:r>
-              <a:rPr lang="en-US" smtClean="0"/>
+              <a:rPr lang="en-US"/>
               <a:t>Object-oriented programming is also based on decomposing the problem; however, the primary focus is on the things that make up the program</a:t>
             </a:r>
-            <a:endParaRPr lang="en-US"/>
           </a:p>
         </p:txBody>
       </p:sp>
@@ -12113,13 +11747,6 @@
   <p:clrMapOvr>
     <a:masterClrMapping/>
   </p:clrMapOvr>
-  <p:timing>
-    <p:tnLst>
-      <p:par>
-        <p:cTn id="1" dur="indefinite" restart="never" nodeType="tmRoot"/>
-      </p:par>
-    </p:tnLst>
-  </p:timing>
 </p:sld>
 </file>
 
@@ -12156,10 +11783,9 @@
           <a:lstStyle/>
           <a:p>
             <a:r>
-              <a:rPr lang="en-US" smtClean="0"/>
+              <a:rPr lang="en-US"/>
               <a:t>Quick Quiz</a:t>
             </a:r>
-            <a:endParaRPr lang="en-US"/>
           </a:p>
         </p:txBody>
       </p:sp>
@@ -12179,16 +11805,15 @@
           <a:lstStyle/>
           <a:p>
             <a:r>
-              <a:rPr lang="en-US" dirty="0" smtClean="0"/>
+              <a:rPr lang="en-US" dirty="0"/>
               <a:t>Name and define the second step in program development.  </a:t>
             </a:r>
           </a:p>
           <a:p>
             <a:r>
-              <a:rPr lang="en-US" dirty="0" smtClean="0"/>
+              <a:rPr lang="en-US" dirty="0"/>
               <a:t>ANSWER:  Outline the solution- is the initial outline usually in a rough draft of the solution which may include: major processing steps involved, major subtasks, user interface, major control structures, major variables and record structures, and the mainline logic.</a:t>
             </a:r>
-            <a:endParaRPr lang="en-US" dirty="0"/>
           </a:p>
         </p:txBody>
       </p:sp>
@@ -12371,10 +11996,9 @@
           <a:lstStyle/>
           <a:p>
             <a:r>
-              <a:rPr lang="en-US" smtClean="0"/>
+              <a:rPr lang="en-US"/>
               <a:t>Quick Quiz</a:t>
             </a:r>
-            <a:endParaRPr lang="en-US"/>
           </a:p>
         </p:txBody>
       </p:sp>
@@ -12394,16 +12018,15 @@
           <a:lstStyle/>
           <a:p>
             <a:r>
-              <a:rPr lang="en-US" dirty="0" smtClean="0"/>
+              <a:rPr lang="en-US" dirty="0"/>
               <a:t>The __________-driven approach to programming is based on the idea that an interaction with the outside world can cause a program to change from one known state to another.  </a:t>
             </a:r>
           </a:p>
           <a:p>
             <a:r>
-              <a:rPr lang="en-US" dirty="0" smtClean="0"/>
+              <a:rPr lang="en-US" dirty="0"/>
               <a:t>ANSWER:  event</a:t>
             </a:r>
-            <a:endParaRPr lang="en-US" dirty="0"/>
           </a:p>
         </p:txBody>
       </p:sp>
@@ -12544,10 +12167,9 @@
           <a:lstStyle/>
           <a:p>
             <a:r>
-              <a:rPr lang="en-US" smtClean="0"/>
+              <a:rPr lang="en-US"/>
               <a:t>Quick Quiz</a:t>
             </a:r>
-            <a:endParaRPr lang="en-US"/>
           </a:p>
         </p:txBody>
       </p:sp>
@@ -12567,16 +12189,15 @@
           <a:lstStyle/>
           <a:p>
             <a:r>
-              <a:rPr lang="en-US" dirty="0" smtClean="0"/>
+              <a:rPr lang="en-US" dirty="0"/>
               <a:t>The choice between procedure-driven, event-driven, or data-driven program design methodologies is usually determined by the selection of a(n) __________.  </a:t>
             </a:r>
           </a:p>
           <a:p>
             <a:r>
-              <a:rPr lang="en-US" dirty="0" smtClean="0"/>
+              <a:rPr lang="en-US" dirty="0"/>
               <a:t>ANSWER:  programming language</a:t>
             </a:r>
-            <a:endParaRPr lang="en-US" dirty="0"/>
           </a:p>
         </p:txBody>
       </p:sp>
@@ -12717,10 +12338,9 @@
           <a:lstStyle/>
           <a:p>
             <a:r>
-              <a:rPr lang="en-US" smtClean="0"/>
+              <a:rPr lang="en-US"/>
               <a:t>Steps in Program Development</a:t>
             </a:r>
-            <a:endParaRPr lang="en-US"/>
           </a:p>
         </p:txBody>
       </p:sp>
@@ -12741,69 +12361,58 @@
           <a:p>
             <a:pPr lvl="1"/>
             <a:r>
-              <a:rPr lang="en-US" dirty="0" smtClean="0"/>
+              <a:rPr lang="en-US" dirty="0"/>
               <a:t>The steps in program design are similar to the steps in problem solving. They are: </a:t>
             </a:r>
           </a:p>
           <a:p>
             <a:pPr lvl="2"/>
             <a:r>
-              <a:rPr lang="en-US" dirty="0" smtClean="0"/>
+              <a:rPr lang="en-US" dirty="0"/>
               <a:t>Define the problem</a:t>
             </a:r>
           </a:p>
           <a:p>
             <a:pPr lvl="2"/>
             <a:r>
-              <a:rPr lang="en-US" dirty="0" smtClean="0"/>
+              <a:rPr lang="en-US" dirty="0"/>
               <a:t>Outline the solution</a:t>
             </a:r>
           </a:p>
           <a:p>
             <a:pPr lvl="2"/>
             <a:r>
-              <a:rPr lang="en-US" dirty="0" smtClean="0"/>
+              <a:rPr lang="en-US" dirty="0"/>
               <a:t>Develop the outline into an algorithm</a:t>
             </a:r>
           </a:p>
           <a:p>
             <a:pPr lvl="2"/>
             <a:r>
-              <a:rPr lang="en-US" dirty="0" smtClean="0"/>
+              <a:rPr lang="en-US" dirty="0"/>
               <a:t>Test the algorithm for correctness</a:t>
             </a:r>
           </a:p>
           <a:p>
             <a:pPr lvl="2"/>
             <a:r>
-              <a:rPr lang="en-US" dirty="0" smtClean="0"/>
-              <a:t>Code the algorithm into a specific programming </a:t>
-            </a:r>
-            <a:r>
-              <a:rPr lang="en-US" dirty="0" smtClean="0"/>
-              <a:t>language (coding)</a:t>
-            </a:r>
-            <a:endParaRPr lang="en-US" dirty="0" smtClean="0"/>
+              <a:rPr lang="en-US" dirty="0"/>
+              <a:t>Code the algorithm into a specific programming language (coding)</a:t>
+            </a:r>
           </a:p>
           <a:p>
             <a:pPr lvl="2"/>
             <a:r>
-              <a:rPr lang="en-US" dirty="0" smtClean="0"/>
-              <a:t>Run the program on the </a:t>
-            </a:r>
-            <a:r>
-              <a:rPr lang="en-US" dirty="0" smtClean="0"/>
-              <a:t>computer</a:t>
-            </a:r>
-            <a:endParaRPr lang="en-US" dirty="0" smtClean="0"/>
+              <a:rPr lang="en-US" dirty="0"/>
+              <a:t>Run the program on the computer</a:t>
+            </a:r>
           </a:p>
           <a:p>
             <a:pPr lvl="2"/>
             <a:r>
-              <a:rPr lang="en-US" dirty="0" smtClean="0"/>
+              <a:rPr lang="en-US" dirty="0"/>
               <a:t>Document and maintain the program </a:t>
             </a:r>
-            <a:endParaRPr lang="en-US" dirty="0"/>
           </a:p>
         </p:txBody>
       </p:sp>
@@ -12817,13 +12426,6 @@
   <p:clrMapOvr>
     <a:masterClrMapping/>
   </p:clrMapOvr>
-  <p:timing>
-    <p:tnLst>
-      <p:par>
-        <p:cTn id="1" dur="indefinite" restart="never" nodeType="tmRoot"/>
-      </p:par>
-    </p:tnLst>
-  </p:timing>
 </p:sld>
 </file>
 
@@ -12860,10 +12462,9 @@
           <a:lstStyle/>
           <a:p>
             <a:r>
-              <a:rPr lang="en-US" smtClean="0"/>
+              <a:rPr lang="en-US"/>
               <a:t>Quick Quiz</a:t>
             </a:r>
-            <a:endParaRPr lang="en-US"/>
           </a:p>
         </p:txBody>
       </p:sp>
@@ -12883,16 +12484,15 @@
           <a:lstStyle/>
           <a:p>
             <a:r>
-              <a:rPr lang="en-US" dirty="0" smtClean="0"/>
+              <a:rPr lang="en-US" dirty="0"/>
               <a:t>__________ programming is based on a structured, top-down approach to writing effective programs.    </a:t>
             </a:r>
           </a:p>
           <a:p>
             <a:r>
-              <a:rPr lang="en-US" dirty="0" smtClean="0"/>
+              <a:rPr lang="en-US" dirty="0"/>
               <a:t>ANSWER:  Procedural</a:t>
             </a:r>
-            <a:endParaRPr lang="en-US" dirty="0"/>
           </a:p>
         </p:txBody>
       </p:sp>
@@ -13033,10 +12633,9 @@
           <a:lstStyle/>
           <a:p>
             <a:r>
-              <a:rPr lang="en-US" smtClean="0"/>
+              <a:rPr lang="en-US"/>
               <a:t>Quick Quiz</a:t>
             </a:r>
-            <a:endParaRPr lang="en-US"/>
           </a:p>
         </p:txBody>
       </p:sp>
@@ -13056,16 +12655,15 @@
           <a:lstStyle/>
           <a:p>
             <a:r>
-              <a:rPr lang="en-US" dirty="0" smtClean="0"/>
+              <a:rPr lang="en-US" dirty="0"/>
               <a:t>___________ programming is also based on decomposing the problem; however, the primary focus is on the things that make up the program.  </a:t>
             </a:r>
           </a:p>
           <a:p>
             <a:r>
-              <a:rPr lang="en-US" dirty="0" smtClean="0"/>
+              <a:rPr lang="en-US" dirty="0"/>
               <a:t>ANSWER:  Object-oriented</a:t>
             </a:r>
-            <a:endParaRPr lang="en-US" dirty="0"/>
           </a:p>
         </p:txBody>
       </p:sp>
@@ -13206,10 +12804,9 @@
           <a:lstStyle/>
           <a:p>
             <a:r>
-              <a:rPr lang="en-US" smtClean="0"/>
+              <a:rPr lang="en-US"/>
               <a:t>Steps in Program Development</a:t>
             </a:r>
-            <a:endParaRPr lang="en-US"/>
           </a:p>
         </p:txBody>
       </p:sp>
@@ -13230,49 +12827,44 @@
           <a:p>
             <a:pPr lvl="1"/>
             <a:r>
-              <a:rPr lang="en-US" dirty="0" smtClean="0"/>
+              <a:rPr lang="en-US" dirty="0"/>
               <a:t>Define the Problem</a:t>
             </a:r>
           </a:p>
           <a:p>
             <a:pPr lvl="1"/>
             <a:r>
-              <a:rPr lang="en-US" dirty="0" smtClean="0"/>
-              <a:t>To </a:t>
-            </a:r>
-            <a:r>
-              <a:rPr lang="en-US" dirty="0" smtClean="0"/>
-              <a:t>help with initial analysis, the problem should be divided into three separate components:</a:t>
+              <a:rPr lang="en-US" dirty="0"/>
+              <a:t>To help with initial analysis, the problem should be divided into three separate components:</a:t>
             </a:r>
           </a:p>
           <a:p>
             <a:pPr lvl="2"/>
             <a:r>
-              <a:rPr lang="en-US" dirty="0" smtClean="0"/>
+              <a:rPr lang="en-US" dirty="0"/>
               <a:t>the inputs - What information is given to you to use to solve the problem? </a:t>
             </a:r>
           </a:p>
           <a:p>
             <a:pPr lvl="2"/>
             <a:r>
-              <a:rPr lang="en-US" dirty="0" smtClean="0"/>
+              <a:rPr lang="en-US" dirty="0"/>
               <a:t>the outputs - What will the solution of the problem, look like </a:t>
             </a:r>
           </a:p>
           <a:p>
             <a:pPr lvl="1"/>
             <a:r>
-              <a:rPr lang="en-US" dirty="0" smtClean="0"/>
+              <a:rPr lang="en-US" dirty="0"/>
               <a:t>the processing steps - What calculations (processes), will be used to change the input information into the desired output? </a:t>
             </a:r>
           </a:p>
           <a:p>
             <a:pPr lvl="2"/>
             <a:r>
-              <a:rPr lang="en-US" dirty="0" smtClean="0"/>
+              <a:rPr lang="en-US" dirty="0"/>
               <a:t>Tool: Defining diagram</a:t>
             </a:r>
-            <a:endParaRPr lang="en-US" dirty="0"/>
           </a:p>
         </p:txBody>
       </p:sp>
@@ -13286,13 +12878,6 @@
   <p:clrMapOvr>
     <a:masterClrMapping/>
   </p:clrMapOvr>
-  <p:timing>
-    <p:tnLst>
-      <p:par>
-        <p:cTn id="1" dur="indefinite" restart="never" nodeType="tmRoot"/>
-      </p:par>
-    </p:tnLst>
-  </p:timing>
 </p:sld>
 </file>
 
@@ -13329,10 +12914,9 @@
           <a:lstStyle/>
           <a:p>
             <a:r>
-              <a:rPr lang="en-US" dirty="0" smtClean="0"/>
+              <a:rPr lang="en-US" dirty="0"/>
               <a:t>Identifying the Problem</a:t>
             </a:r>
-            <a:endParaRPr lang="en-US" dirty="0"/>
           </a:p>
         </p:txBody>
       </p:sp>
@@ -13353,11 +12937,7 @@
           <a:p>
             <a:r>
               <a:rPr lang="en-US" dirty="0"/>
-              <a:t>There are two stages to identifying a solution</a:t>
-            </a:r>
-            <a:r>
-              <a:rPr lang="en-US" dirty="0" smtClean="0"/>
-              <a:t>:</a:t>
+              <a:t>There are two stages to identifying a solution:</a:t>
             </a:r>
           </a:p>
           <a:p>
@@ -13370,7 +12950,7 @@
           <a:p>
             <a:pPr lvl="1"/>
             <a:r>
-              <a:rPr lang="en-US" dirty="0" smtClean="0"/>
+              <a:rPr lang="en-US" dirty="0"/>
               <a:t>Specification</a:t>
             </a:r>
           </a:p>
@@ -13429,10 +13009,9 @@
           <a:lstStyle/>
           <a:p>
             <a:r>
-              <a:rPr lang="en-US" dirty="0" smtClean="0"/>
+              <a:rPr lang="en-US" dirty="0"/>
               <a:t>Requirements</a:t>
             </a:r>
-            <a:endParaRPr lang="en-US" dirty="0"/>
           </a:p>
         </p:txBody>
       </p:sp>
@@ -13455,27 +13034,17 @@
               <a:rPr lang="en-US" dirty="0"/>
               <a:t>The first step is to examine the problem carefully to try to identify what qualifies as a solution. </a:t>
             </a:r>
-            <a:endParaRPr lang="en-US" dirty="0" smtClean="0"/>
-          </a:p>
-          <a:p>
-            <a:r>
-              <a:rPr lang="en-US" dirty="0" smtClean="0"/>
-              <a:t>A </a:t>
-            </a:r>
+          </a:p>
+          <a:p>
             <a:r>
               <a:rPr lang="en-US" dirty="0"/>
-              <a:t>single problem may have many different solutions, but they will all have something in common. </a:t>
-            </a:r>
-            <a:endParaRPr lang="en-US" dirty="0" smtClean="0"/>
-          </a:p>
-          <a:p>
-            <a:r>
-              <a:rPr lang="en-US" dirty="0" smtClean="0"/>
-              <a:t>So </a:t>
-            </a:r>
+              <a:t>A single problem may have many different solutions, but they will all have something in common. </a:t>
+            </a:r>
+          </a:p>
+          <a:p>
             <a:r>
               <a:rPr lang="en-US" dirty="0"/>
-              <a:t>here you're trying to work out exactly what your program will be </a:t>
+              <a:t>So here you're trying to work out exactly what your program will be </a:t>
             </a:r>
             <a:r>
               <a:rPr lang="en-US" i="1" dirty="0"/>
@@ -13485,7 +13054,6 @@
               <a:rPr lang="en-US" dirty="0"/>
               <a:t> to do.</a:t>
             </a:r>
-            <a:endParaRPr lang="en-US" dirty="0"/>
           </a:p>
         </p:txBody>
       </p:sp>
@@ -13535,10 +13103,9 @@
           <a:lstStyle/>
           <a:p>
             <a:r>
-              <a:rPr lang="en-US" dirty="0" smtClean="0"/>
+              <a:rPr lang="en-US" dirty="0"/>
               <a:t>Example: Requirements</a:t>
             </a:r>
-            <a:endParaRPr lang="en-US" dirty="0"/>
           </a:p>
         </p:txBody>
       </p:sp>
@@ -13559,25 +13126,13 @@
           <a:p>
             <a:r>
               <a:rPr lang="en-US" dirty="0"/>
-              <a:t>For example, if we were asked to write a calculator program, we could choose many different ways for the user to enter calculations - from entering equations, pressing buttons or even writing them on the screen - but if the software can't add up correctly then it won't have solved the </a:t>
-            </a:r>
-            <a:r>
-              <a:rPr lang="en-US" dirty="0" smtClean="0"/>
-              <a:t>problem.</a:t>
-            </a:r>
-          </a:p>
-          <a:p>
-            <a:r>
-              <a:rPr lang="en-US" dirty="0" smtClean="0"/>
-              <a:t>Therefore </a:t>
-            </a:r>
+              <a:t>For example, if we were asked to write a calculator program, we could choose many different ways for the user to enter calculations - from entering equations, pressing buttons or even writing them on the screen - but if the software can't add up correctly then it won't have solved the problem.</a:t>
+            </a:r>
+          </a:p>
+          <a:p>
             <a:r>
               <a:rPr lang="en-US" dirty="0"/>
-              <a:t>our first few requirements must be that</a:t>
-            </a:r>
-            <a:r>
-              <a:rPr lang="en-US" dirty="0" smtClean="0"/>
-              <a:t>:</a:t>
+              <a:t>Therefore our first few requirements must be that:</a:t>
             </a:r>
           </a:p>
           <a:p>
@@ -13654,13 +13209,8 @@
           <a:p>
             <a:r>
               <a:rPr lang="en-US" dirty="0"/>
-              <a:t>Example: </a:t>
-            </a:r>
-            <a:r>
-              <a:rPr lang="en-US" dirty="0" smtClean="0"/>
-              <a:t>Requirements (Contd.)</a:t>
-            </a:r>
-            <a:endParaRPr lang="en-US" dirty="0"/>
+              <a:t>Example: Requirements (Contd.)</a:t>
+            </a:r>
           </a:p>
         </p:txBody>
       </p:sp>
@@ -13683,50 +13233,24 @@
               <a:rPr lang="en-US" dirty="0"/>
               <a:t>We also have to decide what sort of sums our calculator will be required to evaluate. </a:t>
             </a:r>
-            <a:endParaRPr lang="en-US" dirty="0" smtClean="0"/>
-          </a:p>
-          <a:p>
-            <a:r>
-              <a:rPr lang="en-US" dirty="0" smtClean="0"/>
-              <a:t>Again</a:t>
-            </a:r>
+          </a:p>
+          <a:p>
             <a:r>
               <a:rPr lang="en-US" dirty="0"/>
-              <a:t>, we have a fair amount of choice - we could be ambitious and ask it to solve simultaneous equations or complex expressions, however since this is our first program we should probably make the requirements more simple. </a:t>
-            </a:r>
-            <a:endParaRPr lang="en-US" dirty="0" smtClean="0"/>
-          </a:p>
-          <a:p>
-            <a:r>
-              <a:rPr lang="en-US" dirty="0" smtClean="0"/>
-              <a:t>So </a:t>
-            </a:r>
+              <a:t>Again, we have a fair amount of choice - we could be ambitious and ask it to solve simultaneous equations or complex expressions, however since this is our first program we should probably make the requirements more simple. </a:t>
+            </a:r>
+          </a:p>
+          <a:p>
             <a:r>
               <a:rPr lang="en-US" dirty="0"/>
-              <a:t>the third requirement is that</a:t>
-            </a:r>
-            <a:r>
-              <a:rPr lang="en-US" dirty="0" smtClean="0"/>
-              <a:t>:</a:t>
+              <a:t>So the third requirement is that:</a:t>
             </a:r>
           </a:p>
           <a:p>
             <a:pPr lvl="1"/>
             <a:r>
               <a:rPr lang="en-US" dirty="0"/>
-              <a:t>The calculator must be able to evaluate sums made up of two whole numbers (integer operands) and one addition (+), subtraction (-), multiplication (*) or division </a:t>
-            </a:r>
-            <a:r>
-              <a:rPr lang="en-US" dirty="0" smtClean="0"/>
-              <a:t>(/) </a:t>
-            </a:r>
-            <a:r>
-              <a:rPr lang="en-US" dirty="0"/>
-              <a:t>sign (operator</a:t>
-            </a:r>
-            <a:r>
-              <a:rPr lang="en-US" dirty="0" smtClean="0"/>
-              <a:t>)</a:t>
+              <a:t>The calculator must be able to evaluate sums made up of two whole numbers (integer operands) and one addition (+), subtraction (-), multiplication (*) or division (/) sign (operator)</a:t>
             </a:r>
           </a:p>
           <a:p>

</xml_diff>